<commit_message>
change PVDIS pi rej from 1e-5 ro 1e-4
</commit_message>
<xml_diff>
--- a/analysis/pid/compare_e_pibggen_result_20200129/solid_pie_zwzhao_20210129.pptx
+++ b/analysis/pid/compare_e_pibggen_result_20200129/solid_pie_zwzhao_20210129.pptx
@@ -283,7 +283,7 @@
   <pc:docChgLst>
     <pc:chgData name="zhiwen zhao" userId="bc03072ab7912b87" providerId="LiveId" clId="{AB79A62B-3265-40A6-BF2B-822730619B29}"/>
     <pc:docChg chg="undo redo custSel addSld delSld modSld sldOrd">
-      <pc:chgData name="zhiwen zhao" userId="bc03072ab7912b87" providerId="LiveId" clId="{AB79A62B-3265-40A6-BF2B-822730619B29}" dt="2021-02-01T19:14:32.631" v="2506" actId="1076"/>
+      <pc:chgData name="zhiwen zhao" userId="bc03072ab7912b87" providerId="LiveId" clId="{AB79A62B-3265-40A6-BF2B-822730619B29}" dt="2021-02-02T19:44:32.692" v="2711" actId="255"/>
       <pc:docMkLst>
         <pc:docMk/>
       </pc:docMkLst>
@@ -318,7 +318,7 @@
         </pc:sldMkLst>
       </pc:sldChg>
       <pc:sldChg chg="addSp delSp modSp mod">
-        <pc:chgData name="zhiwen zhao" userId="bc03072ab7912b87" providerId="LiveId" clId="{AB79A62B-3265-40A6-BF2B-822730619B29}" dt="2021-02-01T19:14:32.631" v="2506" actId="1076"/>
+        <pc:chgData name="zhiwen zhao" userId="bc03072ab7912b87" providerId="LiveId" clId="{AB79A62B-3265-40A6-BF2B-822730619B29}" dt="2021-02-02T19:44:32.692" v="2711" actId="255"/>
         <pc:sldMkLst>
           <pc:docMk/>
           <pc:sldMk cId="2510835119" sldId="299"/>
@@ -356,11 +356,35 @@
           </ac:spMkLst>
         </pc:spChg>
         <pc:spChg chg="mod">
-          <ac:chgData name="zhiwen zhao" userId="bc03072ab7912b87" providerId="LiveId" clId="{AB79A62B-3265-40A6-BF2B-822730619B29}" dt="2021-02-01T19:13:17.551" v="2476" actId="1076"/>
+          <ac:chgData name="zhiwen zhao" userId="bc03072ab7912b87" providerId="LiveId" clId="{AB79A62B-3265-40A6-BF2B-822730619B29}" dt="2021-02-02T19:42:24.339" v="2640" actId="21"/>
           <ac:spMkLst>
             <pc:docMk/>
             <pc:sldMk cId="2510835119" sldId="299"/>
             <ac:spMk id="8" creationId="{5F347E1C-767E-488B-9237-093A4AB657E1}"/>
+          </ac:spMkLst>
+        </pc:spChg>
+        <pc:spChg chg="add del mod">
+          <ac:chgData name="zhiwen zhao" userId="bc03072ab7912b87" providerId="LiveId" clId="{AB79A62B-3265-40A6-BF2B-822730619B29}" dt="2021-02-02T19:43:37.812" v="2699" actId="478"/>
+          <ac:spMkLst>
+            <pc:docMk/>
+            <pc:sldMk cId="2510835119" sldId="299"/>
+            <ac:spMk id="9" creationId="{B2C67B18-085E-4642-8C85-FDD499D4F117}"/>
+          </ac:spMkLst>
+        </pc:spChg>
+        <pc:spChg chg="add del mod">
+          <ac:chgData name="zhiwen zhao" userId="bc03072ab7912b87" providerId="LiveId" clId="{AB79A62B-3265-40A6-BF2B-822730619B29}" dt="2021-02-02T19:43:50.930" v="2704" actId="478"/>
+          <ac:spMkLst>
+            <pc:docMk/>
+            <pc:sldMk cId="2510835119" sldId="299"/>
+            <ac:spMk id="10" creationId="{CE8A71F6-CC7C-49CD-95DF-F720A01F9480}"/>
+          </ac:spMkLst>
+        </pc:spChg>
+        <pc:spChg chg="add mod">
+          <ac:chgData name="zhiwen zhao" userId="bc03072ab7912b87" providerId="LiveId" clId="{AB79A62B-3265-40A6-BF2B-822730619B29}" dt="2021-02-02T19:44:32.692" v="2711" actId="255"/>
+          <ac:spMkLst>
+            <pc:docMk/>
+            <pc:sldMk cId="2510835119" sldId="299"/>
+            <ac:spMk id="12" creationId="{E3F0D2CE-27B8-45C2-94B3-DE4769132CAD}"/>
           </ac:spMkLst>
         </pc:spChg>
         <pc:picChg chg="del">
@@ -545,7 +569,7 @@
         </pc:picChg>
       </pc:sldChg>
       <pc:sldChg chg="addSp delSp modSp add mod">
-        <pc:chgData name="zhiwen zhao" userId="bc03072ab7912b87" providerId="LiveId" clId="{AB79A62B-3265-40A6-BF2B-822730619B29}" dt="2021-02-01T18:48:33.607" v="2472" actId="1036"/>
+        <pc:chgData name="zhiwen zhao" userId="bc03072ab7912b87" providerId="LiveId" clId="{AB79A62B-3265-40A6-BF2B-822730619B29}" dt="2021-02-02T19:41:48.818" v="2611" actId="1036"/>
         <pc:sldMkLst>
           <pc:docMk/>
           <pc:sldMk cId="2967154834" sldId="301"/>
@@ -559,6 +583,14 @@
           </ac:spMkLst>
         </pc:spChg>
         <pc:picChg chg="add del mod">
+          <ac:chgData name="zhiwen zhao" userId="bc03072ab7912b87" providerId="LiveId" clId="{AB79A62B-3265-40A6-BF2B-822730619B29}" dt="2021-02-02T19:41:42.138" v="2591" actId="478"/>
+          <ac:picMkLst>
+            <pc:docMk/>
+            <pc:sldMk cId="2967154834" sldId="301"/>
+            <ac:picMk id="3" creationId="{46CA014F-AD0E-4A9A-BC68-D71264F2B07E}"/>
+          </ac:picMkLst>
+        </pc:picChg>
+        <pc:picChg chg="add del mod">
           <ac:chgData name="zhiwen zhao" userId="bc03072ab7912b87" providerId="LiveId" clId="{AB79A62B-3265-40A6-BF2B-822730619B29}" dt="2021-02-01T18:48:18.056" v="2455" actId="478"/>
           <ac:picMkLst>
             <pc:docMk/>
@@ -566,12 +598,20 @@
             <ac:picMk id="3" creationId="{49BF5636-C544-4774-AD33-374BB8ACF375}"/>
           </ac:picMkLst>
         </pc:picChg>
-        <pc:picChg chg="add mod">
-          <ac:chgData name="zhiwen zhao" userId="bc03072ab7912b87" providerId="LiveId" clId="{AB79A62B-3265-40A6-BF2B-822730619B29}" dt="2021-02-01T18:48:33.607" v="2472" actId="1036"/>
+        <pc:picChg chg="add del mod">
+          <ac:chgData name="zhiwen zhao" userId="bc03072ab7912b87" providerId="LiveId" clId="{AB79A62B-3265-40A6-BF2B-822730619B29}" dt="2021-02-02T19:03:37.980" v="2579" actId="478"/>
           <ac:picMkLst>
             <pc:docMk/>
             <pc:sldMk cId="2967154834" sldId="301"/>
             <ac:picMk id="6" creationId="{8E504B6C-B2F4-417F-A3A6-788727BBDC6D}"/>
+          </ac:picMkLst>
+        </pc:picChg>
+        <pc:picChg chg="add mod">
+          <ac:chgData name="zhiwen zhao" userId="bc03072ab7912b87" providerId="LiveId" clId="{AB79A62B-3265-40A6-BF2B-822730619B29}" dt="2021-02-02T19:41:48.818" v="2611" actId="1036"/>
+          <ac:picMkLst>
+            <pc:docMk/>
+            <pc:sldMk cId="2967154834" sldId="301"/>
+            <ac:picMk id="7" creationId="{12FA862A-8CCB-4DA5-AEB9-4666502CDBC6}"/>
           </ac:picMkLst>
         </pc:picChg>
         <pc:picChg chg="del mod">
@@ -1429,7 +1469,7 @@
           <a:p>
             <a:fld id="{661220E0-8112-4FD5-9ECD-C4518F8A921E}" type="datetimeFigureOut">
               <a:rPr lang="en-US" smtClean="0"/>
-              <a:t>2/1/2021</a:t>
+              <a:t>2/2/2021</a:t>
             </a:fld>
             <a:endParaRPr lang="en-US"/>
           </a:p>
@@ -1607,7 +1647,7 @@
           <a:p>
             <a:fld id="{EC570A9A-DD37-43E6-975F-2B5C6FA088C5}" type="datetimeFigureOut">
               <a:rPr lang="en-US" smtClean="0"/>
-              <a:t>2/1/2021</a:t>
+              <a:t>2/2/2021</a:t>
             </a:fld>
             <a:endParaRPr lang="en-US"/>
           </a:p>
@@ -2054,7 +2094,7 @@
           <a:p>
             <a:fld id="{58FFC3A0-F389-4C88-BEE9-F77C3C7B2A06}" type="datetime1">
               <a:rPr lang="en-US" smtClean="0"/>
-              <a:t>2/1/2021</a:t>
+              <a:t>2/2/2021</a:t>
             </a:fld>
             <a:endParaRPr lang="en-US"/>
           </a:p>
@@ -2218,7 +2258,7 @@
           <a:p>
             <a:fld id="{A467D2D2-D806-448D-8258-95738161CCFB}" type="datetime1">
               <a:rPr lang="en-US" smtClean="0"/>
-              <a:t>2/1/2021</a:t>
+              <a:t>2/2/2021</a:t>
             </a:fld>
             <a:endParaRPr lang="en-US"/>
           </a:p>
@@ -2392,7 +2432,7 @@
           <a:p>
             <a:fld id="{7064F3E1-451D-4203-84DD-F2D1E7480F1D}" type="datetime1">
               <a:rPr lang="en-US" smtClean="0"/>
-              <a:t>2/1/2021</a:t>
+              <a:t>2/2/2021</a:t>
             </a:fld>
             <a:endParaRPr lang="en-US"/>
           </a:p>
@@ -2556,7 +2596,7 @@
           <a:p>
             <a:fld id="{E227E46D-6D4E-4D38-8538-26D134275517}" type="datetime1">
               <a:rPr lang="en-US" smtClean="0"/>
-              <a:t>2/1/2021</a:t>
+              <a:t>2/2/2021</a:t>
             </a:fld>
             <a:endParaRPr lang="en-US"/>
           </a:p>
@@ -2797,7 +2837,7 @@
           <a:p>
             <a:fld id="{76011DF6-DA11-47A4-9B41-192C66B9D22D}" type="datetime1">
               <a:rPr lang="en-US" smtClean="0"/>
-              <a:t>2/1/2021</a:t>
+              <a:t>2/2/2021</a:t>
             </a:fld>
             <a:endParaRPr lang="en-US"/>
           </a:p>
@@ -3078,7 +3118,7 @@
           <a:p>
             <a:fld id="{CF94AFC5-DBD7-4BA2-A72C-32E835CDD8B8}" type="datetime1">
               <a:rPr lang="en-US" smtClean="0"/>
-              <a:t>2/1/2021</a:t>
+              <a:t>2/2/2021</a:t>
             </a:fld>
             <a:endParaRPr lang="en-US"/>
           </a:p>
@@ -3493,7 +3533,7 @@
           <a:p>
             <a:fld id="{8E6E8CBB-5300-4659-9449-5F0E64F32D0E}" type="datetime1">
               <a:rPr lang="en-US" smtClean="0"/>
-              <a:t>2/1/2021</a:t>
+              <a:t>2/2/2021</a:t>
             </a:fld>
             <a:endParaRPr lang="en-US"/>
           </a:p>
@@ -3606,7 +3646,7 @@
           <a:p>
             <a:fld id="{CE02FEDA-7F2C-44F6-8C81-7C15008DD81C}" type="datetime1">
               <a:rPr lang="en-US" smtClean="0"/>
-              <a:t>2/1/2021</a:t>
+              <a:t>2/2/2021</a:t>
             </a:fld>
             <a:endParaRPr lang="en-US"/>
           </a:p>
@@ -3697,7 +3737,7 @@
           <a:p>
             <a:fld id="{B2D55011-1843-4274-9534-C491F2438E42}" type="datetime1">
               <a:rPr lang="en-US" smtClean="0"/>
-              <a:t>2/1/2021</a:t>
+              <a:t>2/2/2021</a:t>
             </a:fld>
             <a:endParaRPr lang="en-US"/>
           </a:p>
@@ -3968,7 +4008,7 @@
           <a:p>
             <a:fld id="{90CE8ACF-4D86-4A43-A667-635E2BAAB854}" type="datetime1">
               <a:rPr lang="en-US" smtClean="0"/>
-              <a:t>2/1/2021</a:t>
+              <a:t>2/2/2021</a:t>
             </a:fld>
             <a:endParaRPr lang="en-US"/>
           </a:p>
@@ -4216,7 +4256,7 @@
           <a:p>
             <a:fld id="{42A1C324-A338-4216-AAD5-067A97EAA700}" type="datetime1">
               <a:rPr lang="en-US" smtClean="0"/>
-              <a:t>2/1/2021</a:t>
+              <a:t>2/2/2021</a:t>
             </a:fld>
             <a:endParaRPr lang="en-US"/>
           </a:p>
@@ -4423,7 +4463,7 @@
           <a:p>
             <a:fld id="{D0FEA00A-1F76-4B11-A98A-C6A004D23DA9}" type="datetime1">
               <a:rPr lang="en-US" smtClean="0"/>
-              <a:t>2/1/2021</a:t>
+              <a:t>2/2/2021</a:t>
             </a:fld>
             <a:endParaRPr lang="en-US"/>
           </a:p>
@@ -5175,7 +5215,7 @@
             <a:pPr lvl="2"/>
             <a:r>
               <a:rPr lang="en-US" dirty="0"/>
-              <a:t>Online performance:  trigger rate study shows general pi rejection factor 1e-2 for EC (6+1module) and additional 6e-3 for LGC (2 pe in each of 2 PMT, P&lt;4GeV), total ~6e-5</a:t>
+              <a:t>Online performance:  trigger rate study shows general pi rejection factor 1e-2 for EC (6+1module) and additional 6e-3 for LGC (2 pe in each of 2 PMT, P&lt;4GeV), total ~6e-5? </a:t>
             </a:r>
           </a:p>
           <a:p>
@@ -5218,14 +5258,14 @@
             <a:pPr lvl="3"/>
             <a:r>
               <a:rPr lang="en-US" dirty="0"/>
-              <a:t>1e-4 (FA P&lt;4GeV) and 5e-3 (FA P&gt;4GeV) and 5e-3 (LA), for SIDIS_He3 and JPsi_LH2</a:t>
+              <a:t>1e-4 (FA P&lt;4GeV  EC+LGC) and 5e-3 (FA P&gt;4GeV EC) and 5e-3 (LA  EC), for SIDIS_He3 and JPsi_LH2</a:t>
             </a:r>
           </a:p>
           <a:p>
             <a:pPr lvl="3"/>
             <a:r>
               <a:rPr lang="en-US" dirty="0"/>
-              <a:t>1e-5 (FA P&lt;4GeV) and 5e-3 (FA P&gt;4GeV), for PVDIS_LD2</a:t>
+              <a:t>1e-4 (FA P&lt;4GeV EC+LGC) and 5e-3 (FA P&gt;4GeV  EC), for PVDIS_LD2</a:t>
             </a:r>
           </a:p>
           <a:p>
@@ -5375,6 +5415,54 @@
             <a:r>
               <a:rPr lang="en-US" sz="1500" dirty="0"/>
               <a:t>Code and log in https://github.com/JeffersonLab/solid_gemc/tree/master/analysis/pid</a:t>
+            </a:r>
+          </a:p>
+        </p:txBody>
+      </p:sp>
+      <p:sp>
+        <p:nvSpPr>
+          <p:cNvPr id="12" name="TextBox 11">
+            <a:extLst>
+              <a:ext uri="{FF2B5EF4-FFF2-40B4-BE49-F238E27FC236}">
+                <a16:creationId xmlns:a16="http://schemas.microsoft.com/office/drawing/2014/main" id="{E3F0D2CE-27B8-45C2-94B3-DE4769132CAD}"/>
+              </a:ext>
+            </a:extLst>
+          </p:cNvPr>
+          <p:cNvSpPr txBox="1"/>
+          <p:nvPr/>
+        </p:nvSpPr>
+        <p:spPr>
+          <a:xfrm>
+            <a:off x="5244483" y="4343400"/>
+            <a:ext cx="3581400" cy="492443"/>
+          </a:xfrm>
+          <a:prstGeom prst="rect">
+            <a:avLst/>
+          </a:prstGeom>
+        </p:spPr>
+        <p:style>
+          <a:lnRef idx="2">
+            <a:schemeClr val="accent3"/>
+          </a:lnRef>
+          <a:fillRef idx="1">
+            <a:schemeClr val="lt1"/>
+          </a:fillRef>
+          <a:effectRef idx="0">
+            <a:schemeClr val="accent3"/>
+          </a:effectRef>
+          <a:fontRef idx="minor">
+            <a:schemeClr val="dk1"/>
+          </a:fontRef>
+        </p:style>
+        <p:txBody>
+          <a:bodyPr wrap="square">
+            <a:spAutoFit/>
+          </a:bodyPr>
+          <a:lstStyle/>
+          <a:p>
+            <a:r>
+              <a:rPr lang="en-US" sz="1300" dirty="0"/>
+              <a:t>LGC using N2 instead of CO2, could have rejection much higher than 4GeV?</a:t>
             </a:r>
           </a:p>
         </p:txBody>
@@ -5761,10 +5849,10 @@
       </p:sp>
       <p:pic>
         <p:nvPicPr>
-          <p:cNvPr id="6" name="Picture 5">
+          <p:cNvPr id="7" name="Picture 6">
             <a:extLst>
               <a:ext uri="{FF2B5EF4-FFF2-40B4-BE49-F238E27FC236}">
-                <a16:creationId xmlns:a16="http://schemas.microsoft.com/office/drawing/2014/main" id="{8E504B6C-B2F4-417F-A3A6-788727BBDC6D}"/>
+                <a16:creationId xmlns:a16="http://schemas.microsoft.com/office/drawing/2014/main" id="{12FA862A-8CCB-4DA5-AEB9-4666502CDBC6}"/>
               </a:ext>
             </a:extLst>
           </p:cNvPr>
@@ -5781,8 +5869,8 @@
         </p:blipFill>
         <p:spPr>
           <a:xfrm>
-            <a:off x="0" y="1207046"/>
-            <a:ext cx="9144000" cy="4965154"/>
+            <a:off x="0" y="1098468"/>
+            <a:ext cx="9144000" cy="5302332"/>
           </a:xfrm>
           <a:prstGeom prst="rect">
             <a:avLst/>

</xml_diff>

<commit_message>
add pi+ for PVDIS_LD2
</commit_message>
<xml_diff>
--- a/analysis/pid/compare_e_pibggen_result_20200129/solid_pie_zwzhao_20210129.pptx
+++ b/analysis/pid/compare_e_pibggen_result_20200129/solid_pie_zwzhao_20210129.pptx
@@ -5,10 +5,10 @@
     <p:sldMasterId id="2147483648" r:id="rId1"/>
   </p:sldMasterIdLst>
   <p:notesMasterIdLst>
-    <p:notesMasterId r:id="rId11"/>
+    <p:notesMasterId r:id="rId14"/>
   </p:notesMasterIdLst>
   <p:handoutMasterIdLst>
-    <p:handoutMasterId r:id="rId12"/>
+    <p:handoutMasterId r:id="rId15"/>
   </p:handoutMasterIdLst>
   <p:sldIdLst>
     <p:sldId id="256" r:id="rId2"/>
@@ -16,20 +16,23 @@
     <p:sldId id="307" r:id="rId4"/>
     <p:sldId id="305" r:id="rId5"/>
     <p:sldId id="301" r:id="rId6"/>
-    <p:sldId id="306" r:id="rId7"/>
-    <p:sldId id="302" r:id="rId8"/>
-    <p:sldId id="304" r:id="rId9"/>
-    <p:sldId id="300" r:id="rId10"/>
+    <p:sldId id="310" r:id="rId7"/>
+    <p:sldId id="308" r:id="rId8"/>
+    <p:sldId id="306" r:id="rId9"/>
+    <p:sldId id="302" r:id="rId10"/>
+    <p:sldId id="304" r:id="rId11"/>
+    <p:sldId id="300" r:id="rId12"/>
+    <p:sldId id="309" r:id="rId13"/>
   </p:sldIdLst>
   <p:sldSz cx="9144000" cy="6858000" type="screen4x3"/>
   <p:notesSz cx="6858000" cy="9144000"/>
   <p:embeddedFontLst>
     <p:embeddedFont>
       <p:font typeface="Calibri" panose="020F0502020204030204" pitchFamily="34" charset="0"/>
-      <p:regular r:id="rId13"/>
-      <p:bold r:id="rId14"/>
-      <p:italic r:id="rId15"/>
-      <p:boldItalic r:id="rId16"/>
+      <p:regular r:id="rId16"/>
+      <p:bold r:id="rId17"/>
+      <p:italic r:id="rId18"/>
+      <p:boldItalic r:id="rId19"/>
     </p:embeddedFont>
   </p:embeddedFontLst>
   <p:defaultTextStyle>
@@ -149,6 +152,114 @@
 <file path=ppt/changesInfos/changesInfo1.xml><?xml version="1.0" encoding="utf-8"?>
 <pc:chgInfo xmlns:a="http://schemas.openxmlformats.org/drawingml/2006/main" xmlns:r="http://schemas.openxmlformats.org/officeDocument/2006/relationships" xmlns:ac="http://schemas.microsoft.com/office/drawing/2013/main/command" xmlns:pc="http://schemas.microsoft.com/office/powerpoint/2013/main/command">
   <pc:docChgLst>
+    <pc:chgData name="zhiwen zhao" userId="bc03072ab7912b87" providerId="LiveId" clId="{523708D4-8772-4DE3-87F4-68DA333D5E17}"/>
+    <pc:docChg chg="undo custSel addSld modSld">
+      <pc:chgData name="zhiwen zhao" userId="bc03072ab7912b87" providerId="LiveId" clId="{523708D4-8772-4DE3-87F4-68DA333D5E17}" dt="2021-03-11T23:47:44.802" v="30" actId="20577"/>
+      <pc:docMkLst>
+        <pc:docMk/>
+      </pc:docMkLst>
+      <pc:sldChg chg="modSp mod">
+        <pc:chgData name="zhiwen zhao" userId="bc03072ab7912b87" providerId="LiveId" clId="{523708D4-8772-4DE3-87F4-68DA333D5E17}" dt="2021-03-11T23:47:44.802" v="30" actId="20577"/>
+        <pc:sldMkLst>
+          <pc:docMk/>
+          <pc:sldMk cId="0" sldId="256"/>
+        </pc:sldMkLst>
+        <pc:spChg chg="mod">
+          <ac:chgData name="zhiwen zhao" userId="bc03072ab7912b87" providerId="LiveId" clId="{523708D4-8772-4DE3-87F4-68DA333D5E17}" dt="2021-03-11T23:47:44.802" v="30" actId="20577"/>
+          <ac:spMkLst>
+            <pc:docMk/>
+            <pc:sldMk cId="0" sldId="256"/>
+            <ac:spMk id="3" creationId="{00000000-0000-0000-0000-000000000000}"/>
+          </ac:spMkLst>
+        </pc:spChg>
+      </pc:sldChg>
+      <pc:sldChg chg="addSp delSp modSp mod">
+        <pc:chgData name="zhiwen zhao" userId="bc03072ab7912b87" providerId="LiveId" clId="{523708D4-8772-4DE3-87F4-68DA333D5E17}" dt="2021-03-11T23:45:15.154" v="7" actId="478"/>
+        <pc:sldMkLst>
+          <pc:docMk/>
+          <pc:sldMk cId="2211995282" sldId="300"/>
+        </pc:sldMkLst>
+        <pc:picChg chg="add del mod">
+          <ac:chgData name="zhiwen zhao" userId="bc03072ab7912b87" providerId="LiveId" clId="{523708D4-8772-4DE3-87F4-68DA333D5E17}" dt="2021-03-11T23:45:15.154" v="7" actId="478"/>
+          <ac:picMkLst>
+            <pc:docMk/>
+            <pc:sldMk cId="2211995282" sldId="300"/>
+            <ac:picMk id="4" creationId="{B3CAEA64-7FFE-4967-8465-6ECD63158D8A}"/>
+          </ac:picMkLst>
+        </pc:picChg>
+      </pc:sldChg>
+      <pc:sldChg chg="new">
+        <pc:chgData name="zhiwen zhao" userId="bc03072ab7912b87" providerId="LiveId" clId="{523708D4-8772-4DE3-87F4-68DA333D5E17}" dt="2021-03-11T23:44:08.785" v="0" actId="680"/>
+        <pc:sldMkLst>
+          <pc:docMk/>
+          <pc:sldMk cId="3947213567" sldId="308"/>
+        </pc:sldMkLst>
+      </pc:sldChg>
+      <pc:sldChg chg="addSp delSp modSp add mod">
+        <pc:chgData name="zhiwen zhao" userId="bc03072ab7912b87" providerId="LiveId" clId="{523708D4-8772-4DE3-87F4-68DA333D5E17}" dt="2021-03-11T23:45:55.519" v="14" actId="166"/>
+        <pc:sldMkLst>
+          <pc:docMk/>
+          <pc:sldMk cId="852861027" sldId="309"/>
+        </pc:sldMkLst>
+        <pc:picChg chg="add del mod ord">
+          <ac:chgData name="zhiwen zhao" userId="bc03072ab7912b87" providerId="LiveId" clId="{523708D4-8772-4DE3-87F4-68DA333D5E17}" dt="2021-03-11T23:45:55.519" v="14" actId="166"/>
+          <ac:picMkLst>
+            <pc:docMk/>
+            <pc:sldMk cId="852861027" sldId="309"/>
+            <ac:picMk id="4" creationId="{B3CAEA64-7FFE-4967-8465-6ECD63158D8A}"/>
+          </ac:picMkLst>
+        </pc:picChg>
+        <pc:picChg chg="del">
+          <ac:chgData name="zhiwen zhao" userId="bc03072ab7912b87" providerId="LiveId" clId="{523708D4-8772-4DE3-87F4-68DA333D5E17}" dt="2021-03-11T23:45:25.906" v="10" actId="478"/>
+          <ac:picMkLst>
+            <pc:docMk/>
+            <pc:sldMk cId="852861027" sldId="309"/>
+            <ac:picMk id="6" creationId="{2E59A4BC-B2F2-4C23-8873-A2C2627D9DE6}"/>
+          </ac:picMkLst>
+        </pc:picChg>
+        <pc:picChg chg="del">
+          <ac:chgData name="zhiwen zhao" userId="bc03072ab7912b87" providerId="LiveId" clId="{523708D4-8772-4DE3-87F4-68DA333D5E17}" dt="2021-03-11T23:45:20.241" v="8" actId="478"/>
+          <ac:picMkLst>
+            <pc:docMk/>
+            <pc:sldMk cId="852861027" sldId="309"/>
+            <ac:picMk id="7" creationId="{F1D1C1D6-5F55-4C61-92F7-237B73481F90}"/>
+          </ac:picMkLst>
+        </pc:picChg>
+        <pc:picChg chg="add mod">
+          <ac:chgData name="zhiwen zhao" userId="bc03072ab7912b87" providerId="LiveId" clId="{523708D4-8772-4DE3-87F4-68DA333D5E17}" dt="2021-03-11T23:45:49.609" v="13" actId="1076"/>
+          <ac:picMkLst>
+            <pc:docMk/>
+            <pc:sldMk cId="852861027" sldId="309"/>
+            <ac:picMk id="9" creationId="{2CFA8BF7-0E49-4480-A829-1BF826C96923}"/>
+          </ac:picMkLst>
+        </pc:picChg>
+      </pc:sldChg>
+      <pc:sldChg chg="addSp modSp new mod">
+        <pc:chgData name="zhiwen zhao" userId="bc03072ab7912b87" providerId="LiveId" clId="{523708D4-8772-4DE3-87F4-68DA333D5E17}" dt="2021-03-11T23:46:34.885" v="19" actId="120"/>
+        <pc:sldMkLst>
+          <pc:docMk/>
+          <pc:sldMk cId="4137266342" sldId="310"/>
+        </pc:sldMkLst>
+        <pc:spChg chg="mod">
+          <ac:chgData name="zhiwen zhao" userId="bc03072ab7912b87" providerId="LiveId" clId="{523708D4-8772-4DE3-87F4-68DA333D5E17}" dt="2021-03-11T23:46:34.885" v="19" actId="120"/>
+          <ac:spMkLst>
+            <pc:docMk/>
+            <pc:sldMk cId="4137266342" sldId="310"/>
+            <ac:spMk id="2" creationId="{24B0F77D-D7F9-4D8F-9CAD-E077B29CBDB1}"/>
+          </ac:spMkLst>
+        </pc:spChg>
+        <pc:picChg chg="add mod">
+          <ac:chgData name="zhiwen zhao" userId="bc03072ab7912b87" providerId="LiveId" clId="{523708D4-8772-4DE3-87F4-68DA333D5E17}" dt="2021-03-11T23:46:24.017" v="17" actId="1076"/>
+          <ac:picMkLst>
+            <pc:docMk/>
+            <pc:sldMk cId="4137266342" sldId="310"/>
+            <ac:picMk id="6" creationId="{C0205CAA-27D9-4F6D-8801-3983C7F91721}"/>
+          </ac:picMkLst>
+        </pc:picChg>
+      </pc:sldChg>
+    </pc:docChg>
+  </pc:docChgLst>
+  <pc:docChgLst>
     <pc:chgData name="zhiwen zhao" userId="bc03072ab7912b87" providerId="LiveId" clId="{632E4759-346D-49DF-B20D-FB9FD497FCD4}"/>
     <pc:docChg chg="undo custSel addSld delSld modSld">
       <pc:chgData name="zhiwen zhao" userId="bc03072ab7912b87" providerId="LiveId" clId="{632E4759-346D-49DF-B20D-FB9FD497FCD4}" dt="2020-05-05T14:32:36.306" v="661" actId="20577"/>
@@ -1469,7 +1580,7 @@
           <a:p>
             <a:fld id="{661220E0-8112-4FD5-9ECD-C4518F8A921E}" type="datetimeFigureOut">
               <a:rPr lang="en-US" smtClean="0"/>
-              <a:t>2/2/2021</a:t>
+              <a:t>3/11/2021</a:t>
             </a:fld>
             <a:endParaRPr lang="en-US"/>
           </a:p>
@@ -1647,7 +1758,7 @@
           <a:p>
             <a:fld id="{EC570A9A-DD37-43E6-975F-2B5C6FA088C5}" type="datetimeFigureOut">
               <a:rPr lang="en-US" smtClean="0"/>
-              <a:t>2/2/2021</a:t>
+              <a:t>3/11/2021</a:t>
             </a:fld>
             <a:endParaRPr lang="en-US"/>
           </a:p>
@@ -2094,7 +2205,7 @@
           <a:p>
             <a:fld id="{58FFC3A0-F389-4C88-BEE9-F77C3C7B2A06}" type="datetime1">
               <a:rPr lang="en-US" smtClean="0"/>
-              <a:t>2/2/2021</a:t>
+              <a:t>3/11/2021</a:t>
             </a:fld>
             <a:endParaRPr lang="en-US"/>
           </a:p>
@@ -2258,7 +2369,7 @@
           <a:p>
             <a:fld id="{A467D2D2-D806-448D-8258-95738161CCFB}" type="datetime1">
               <a:rPr lang="en-US" smtClean="0"/>
-              <a:t>2/2/2021</a:t>
+              <a:t>3/11/2021</a:t>
             </a:fld>
             <a:endParaRPr lang="en-US"/>
           </a:p>
@@ -2432,7 +2543,7 @@
           <a:p>
             <a:fld id="{7064F3E1-451D-4203-84DD-F2D1E7480F1D}" type="datetime1">
               <a:rPr lang="en-US" smtClean="0"/>
-              <a:t>2/2/2021</a:t>
+              <a:t>3/11/2021</a:t>
             </a:fld>
             <a:endParaRPr lang="en-US"/>
           </a:p>
@@ -2596,7 +2707,7 @@
           <a:p>
             <a:fld id="{E227E46D-6D4E-4D38-8538-26D134275517}" type="datetime1">
               <a:rPr lang="en-US" smtClean="0"/>
-              <a:t>2/2/2021</a:t>
+              <a:t>3/11/2021</a:t>
             </a:fld>
             <a:endParaRPr lang="en-US"/>
           </a:p>
@@ -2837,7 +2948,7 @@
           <a:p>
             <a:fld id="{76011DF6-DA11-47A4-9B41-192C66B9D22D}" type="datetime1">
               <a:rPr lang="en-US" smtClean="0"/>
-              <a:t>2/2/2021</a:t>
+              <a:t>3/11/2021</a:t>
             </a:fld>
             <a:endParaRPr lang="en-US"/>
           </a:p>
@@ -3118,7 +3229,7 @@
           <a:p>
             <a:fld id="{CF94AFC5-DBD7-4BA2-A72C-32E835CDD8B8}" type="datetime1">
               <a:rPr lang="en-US" smtClean="0"/>
-              <a:t>2/2/2021</a:t>
+              <a:t>3/11/2021</a:t>
             </a:fld>
             <a:endParaRPr lang="en-US"/>
           </a:p>
@@ -3533,7 +3644,7 @@
           <a:p>
             <a:fld id="{8E6E8CBB-5300-4659-9449-5F0E64F32D0E}" type="datetime1">
               <a:rPr lang="en-US" smtClean="0"/>
-              <a:t>2/2/2021</a:t>
+              <a:t>3/11/2021</a:t>
             </a:fld>
             <a:endParaRPr lang="en-US"/>
           </a:p>
@@ -3646,7 +3757,7 @@
           <a:p>
             <a:fld id="{CE02FEDA-7F2C-44F6-8C81-7C15008DD81C}" type="datetime1">
               <a:rPr lang="en-US" smtClean="0"/>
-              <a:t>2/2/2021</a:t>
+              <a:t>3/11/2021</a:t>
             </a:fld>
             <a:endParaRPr lang="en-US"/>
           </a:p>
@@ -3737,7 +3848,7 @@
           <a:p>
             <a:fld id="{B2D55011-1843-4274-9534-C491F2438E42}" type="datetime1">
               <a:rPr lang="en-US" smtClean="0"/>
-              <a:t>2/2/2021</a:t>
+              <a:t>3/11/2021</a:t>
             </a:fld>
             <a:endParaRPr lang="en-US"/>
           </a:p>
@@ -4008,7 +4119,7 @@
           <a:p>
             <a:fld id="{90CE8ACF-4D86-4A43-A667-635E2BAAB854}" type="datetime1">
               <a:rPr lang="en-US" smtClean="0"/>
-              <a:t>2/2/2021</a:t>
+              <a:t>3/11/2021</a:t>
             </a:fld>
             <a:endParaRPr lang="en-US"/>
           </a:p>
@@ -4256,7 +4367,7 @@
           <a:p>
             <a:fld id="{42A1C324-A338-4216-AAD5-067A97EAA700}" type="datetime1">
               <a:rPr lang="en-US" smtClean="0"/>
-              <a:t>2/2/2021</a:t>
+              <a:t>3/11/2021</a:t>
             </a:fld>
             <a:endParaRPr lang="en-US"/>
           </a:p>
@@ -4463,7 +4574,7 @@
           <a:p>
             <a:fld id="{D0FEA00A-1F76-4B11-A98A-C6A004D23DA9}" type="datetime1">
               <a:rPr lang="en-US" smtClean="0"/>
-              <a:t>2/2/2021</a:t>
+              <a:t>3/11/2021</a:t>
             </a:fld>
             <a:endParaRPr lang="en-US"/>
           </a:p>
@@ -4873,12 +4984,20 @@
         </p:nvSpPr>
         <p:spPr/>
         <p:txBody>
-          <a:bodyPr/>
+          <a:bodyPr>
+            <a:normAutofit/>
+          </a:bodyPr>
           <a:lstStyle/>
           <a:p>
             <a:r>
               <a:rPr lang="en-US" dirty="0"/>
               <a:t>Zhiwen Zhao</a:t>
+            </a:r>
+          </a:p>
+          <a:p>
+            <a:r>
+              <a:rPr lang="en-US"/>
+              <a:t>2021/03/11</a:t>
             </a:r>
           </a:p>
           <a:p>
@@ -4920,6 +5039,634 @@
         </p:txBody>
       </p:sp>
     </p:spTree>
+  </p:cSld>
+  <p:clrMapOvr>
+    <a:masterClrMapping/>
+  </p:clrMapOvr>
+</p:sld>
+</file>
+
+<file path=ppt/slides/slide10.xml><?xml version="1.0" encoding="utf-8"?>
+<p:sld xmlns:a="http://schemas.openxmlformats.org/drawingml/2006/main" xmlns:r="http://schemas.openxmlformats.org/officeDocument/2006/relationships" xmlns:p="http://schemas.openxmlformats.org/presentationml/2006/main">
+  <p:cSld>
+    <p:spTree>
+      <p:nvGrpSpPr>
+        <p:cNvPr id="1" name=""/>
+        <p:cNvGrpSpPr/>
+        <p:nvPr/>
+      </p:nvGrpSpPr>
+      <p:grpSpPr>
+        <a:xfrm>
+          <a:off x="0" y="0"/>
+          <a:ext cx="0" cy="0"/>
+          <a:chOff x="0" y="0"/>
+          <a:chExt cx="0" cy="0"/>
+        </a:xfrm>
+      </p:grpSpPr>
+      <p:pic>
+        <p:nvPicPr>
+          <p:cNvPr id="10" name="Content Placeholder 5" descr="Chart, histogram&#10;&#10;Description automatically generated">
+            <a:extLst>
+              <a:ext uri="{FF2B5EF4-FFF2-40B4-BE49-F238E27FC236}">
+                <a16:creationId xmlns:a16="http://schemas.microsoft.com/office/drawing/2014/main" id="{8BEF43EC-B118-4467-AC82-C109C694031E}"/>
+              </a:ext>
+            </a:extLst>
+          </p:cNvPr>
+          <p:cNvPicPr>
+            <a:picLocks noChangeAspect="1"/>
+          </p:cNvPicPr>
+          <p:nvPr/>
+        </p:nvPicPr>
+        <p:blipFill>
+          <a:blip r:embed="rId2">
+            <a:extLst>
+              <a:ext uri="{28A0092B-C50C-407E-A947-70E740481C1C}">
+                <a14:useLocalDpi xmlns:a14="http://schemas.microsoft.com/office/drawing/2010/main" val="0"/>
+              </a:ext>
+            </a:extLst>
+          </a:blip>
+          <a:stretch>
+            <a:fillRect/>
+          </a:stretch>
+        </p:blipFill>
+        <p:spPr>
+          <a:xfrm>
+            <a:off x="0" y="4114800"/>
+            <a:ext cx="5053560" cy="2743200"/>
+          </a:xfrm>
+          <a:prstGeom prst="rect">
+            <a:avLst/>
+          </a:prstGeom>
+        </p:spPr>
+      </p:pic>
+      <p:sp>
+        <p:nvSpPr>
+          <p:cNvPr id="2" name="Title 1">
+            <a:extLst>
+              <a:ext uri="{FF2B5EF4-FFF2-40B4-BE49-F238E27FC236}">
+                <a16:creationId xmlns:a16="http://schemas.microsoft.com/office/drawing/2014/main" id="{3D2769D3-16C4-4C71-8FD3-2B57E6DCFB90}"/>
+              </a:ext>
+            </a:extLst>
+          </p:cNvPr>
+          <p:cNvSpPr>
+            <a:spLocks noGrp="1"/>
+          </p:cNvSpPr>
+          <p:nvPr>
+            <p:ph type="title"/>
+          </p:nvPr>
+        </p:nvSpPr>
+        <p:spPr/>
+        <p:txBody>
+          <a:bodyPr/>
+          <a:lstStyle/>
+          <a:p>
+            <a:endParaRPr lang="en-US"/>
+          </a:p>
+        </p:txBody>
+      </p:sp>
+      <p:pic>
+        <p:nvPicPr>
+          <p:cNvPr id="6" name="Content Placeholder 5" descr="Chart, histogram&#10;&#10;Description automatically generated">
+            <a:extLst>
+              <a:ext uri="{FF2B5EF4-FFF2-40B4-BE49-F238E27FC236}">
+                <a16:creationId xmlns:a16="http://schemas.microsoft.com/office/drawing/2014/main" id="{F872EA14-4EC5-4B8C-B6CF-A0CC8E8733CB}"/>
+              </a:ext>
+            </a:extLst>
+          </p:cNvPr>
+          <p:cNvPicPr>
+            <a:picLocks noGrp="1" noChangeAspect="1"/>
+          </p:cNvPicPr>
+          <p:nvPr>
+            <p:ph idx="1"/>
+          </p:nvPr>
+        </p:nvPicPr>
+        <p:blipFill>
+          <a:blip r:embed="rId3">
+            <a:extLst>
+              <a:ext uri="{28A0092B-C50C-407E-A947-70E740481C1C}">
+                <a14:useLocalDpi xmlns:a14="http://schemas.microsoft.com/office/drawing/2010/main" val="0"/>
+              </a:ext>
+            </a:extLst>
+          </a:blip>
+          <a:stretch>
+            <a:fillRect/>
+          </a:stretch>
+        </p:blipFill>
+        <p:spPr>
+          <a:xfrm>
+            <a:off x="3938038" y="96376"/>
+            <a:ext cx="5053561" cy="2743200"/>
+          </a:xfrm>
+        </p:spPr>
+      </p:pic>
+      <p:sp>
+        <p:nvSpPr>
+          <p:cNvPr id="4" name="Slide Number Placeholder 3">
+            <a:extLst>
+              <a:ext uri="{FF2B5EF4-FFF2-40B4-BE49-F238E27FC236}">
+                <a16:creationId xmlns:a16="http://schemas.microsoft.com/office/drawing/2014/main" id="{74286B5F-9139-4B3F-B252-6B0D6CE6E796}"/>
+              </a:ext>
+            </a:extLst>
+          </p:cNvPr>
+          <p:cNvSpPr>
+            <a:spLocks noGrp="1"/>
+          </p:cNvSpPr>
+          <p:nvPr>
+            <p:ph type="sldNum" sz="quarter" idx="12"/>
+          </p:nvPr>
+        </p:nvSpPr>
+        <p:spPr/>
+        <p:txBody>
+          <a:bodyPr/>
+          <a:lstStyle/>
+          <a:p>
+            <a:fld id="{B6F15528-21DE-4FAA-801E-634DDDAF4B2B}" type="slidenum">
+              <a:rPr lang="en-US" smtClean="0"/>
+              <a:pPr/>
+              <a:t>10</a:t>
+            </a:fld>
+            <a:endParaRPr lang="en-US"/>
+          </a:p>
+        </p:txBody>
+      </p:sp>
+      <p:pic>
+        <p:nvPicPr>
+          <p:cNvPr id="8" name="Picture 7" descr="Chart, histogram&#10;&#10;Description automatically generated">
+            <a:extLst>
+              <a:ext uri="{FF2B5EF4-FFF2-40B4-BE49-F238E27FC236}">
+                <a16:creationId xmlns:a16="http://schemas.microsoft.com/office/drawing/2014/main" id="{91164645-200C-464F-BF1B-25F50D95DB90}"/>
+              </a:ext>
+            </a:extLst>
+          </p:cNvPr>
+          <p:cNvPicPr>
+            <a:picLocks noChangeAspect="1"/>
+          </p:cNvPicPr>
+          <p:nvPr/>
+        </p:nvPicPr>
+        <p:blipFill>
+          <a:blip r:embed="rId4">
+            <a:extLst>
+              <a:ext uri="{28A0092B-C50C-407E-A947-70E740481C1C}">
+                <a14:useLocalDpi xmlns:a14="http://schemas.microsoft.com/office/drawing/2010/main" val="0"/>
+              </a:ext>
+            </a:extLst>
+          </a:blip>
+          <a:stretch>
+            <a:fillRect/>
+          </a:stretch>
+        </p:blipFill>
+        <p:spPr>
+          <a:xfrm>
+            <a:off x="3938040" y="2839576"/>
+            <a:ext cx="5053559" cy="2743200"/>
+          </a:xfrm>
+          <a:prstGeom prst="rect">
+            <a:avLst/>
+          </a:prstGeom>
+        </p:spPr>
+      </p:pic>
+      <p:sp>
+        <p:nvSpPr>
+          <p:cNvPr id="9" name="Title 1">
+            <a:extLst>
+              <a:ext uri="{FF2B5EF4-FFF2-40B4-BE49-F238E27FC236}">
+                <a16:creationId xmlns:a16="http://schemas.microsoft.com/office/drawing/2014/main" id="{79418FCD-7505-4F2E-BE7F-0FE842BCB360}"/>
+              </a:ext>
+            </a:extLst>
+          </p:cNvPr>
+          <p:cNvSpPr txBox="1">
+            <a:spLocks/>
+          </p:cNvSpPr>
+          <p:nvPr/>
+        </p:nvSpPr>
+        <p:spPr>
+          <a:xfrm>
+            <a:off x="609600" y="427038"/>
+            <a:ext cx="8229600" cy="1143000"/>
+          </a:xfrm>
+          <a:prstGeom prst="rect">
+            <a:avLst/>
+          </a:prstGeom>
+        </p:spPr>
+        <p:txBody>
+          <a:bodyPr vert="horz" lIns="91440" tIns="45720" rIns="91440" bIns="45720" rtlCol="0" anchor="ctr">
+            <a:normAutofit/>
+          </a:bodyPr>
+          <a:lstStyle>
+            <a:lvl1pPr algn="ctr" defTabSz="914400" rtl="0" eaLnBrk="1" latinLnBrk="0" hangingPunct="1">
+              <a:spcBef>
+                <a:spcPct val="0"/>
+              </a:spcBef>
+              <a:buNone/>
+              <a:defRPr sz="4400" kern="1200">
+                <a:solidFill>
+                  <a:schemeClr val="tx1"/>
+                </a:solidFill>
+                <a:latin typeface="+mj-lt"/>
+                <a:ea typeface="+mj-ea"/>
+                <a:cs typeface="+mj-cs"/>
+              </a:defRPr>
+            </a:lvl1pPr>
+          </a:lstStyle>
+          <a:p>
+            <a:pPr algn="l"/>
+            <a:r>
+              <a:rPr lang="en-US" sz="3000" dirty="0"/>
+              <a:t>JPsi_LH2</a:t>
+            </a:r>
+          </a:p>
+        </p:txBody>
+      </p:sp>
+    </p:spTree>
+    <p:extLst>
+      <p:ext uri="{BB962C8B-B14F-4D97-AF65-F5344CB8AC3E}">
+        <p14:creationId xmlns:p14="http://schemas.microsoft.com/office/powerpoint/2010/main" val="3660164986"/>
+      </p:ext>
+    </p:extLst>
+  </p:cSld>
+  <p:clrMapOvr>
+    <a:masterClrMapping/>
+  </p:clrMapOvr>
+</p:sld>
+</file>
+
+<file path=ppt/slides/slide11.xml><?xml version="1.0" encoding="utf-8"?>
+<p:sld xmlns:a="http://schemas.openxmlformats.org/drawingml/2006/main" xmlns:r="http://schemas.openxmlformats.org/officeDocument/2006/relationships" xmlns:p="http://schemas.openxmlformats.org/presentationml/2006/main">
+  <p:cSld>
+    <p:spTree>
+      <p:nvGrpSpPr>
+        <p:cNvPr id="1" name=""/>
+        <p:cNvGrpSpPr/>
+        <p:nvPr/>
+      </p:nvGrpSpPr>
+      <p:grpSpPr>
+        <a:xfrm>
+          <a:off x="0" y="0"/>
+          <a:ext cx="0" cy="0"/>
+          <a:chOff x="0" y="0"/>
+          <a:chExt cx="0" cy="0"/>
+        </a:xfrm>
+      </p:grpSpPr>
+      <p:pic>
+        <p:nvPicPr>
+          <p:cNvPr id="6" name="Content Placeholder 5" descr="Chart, histogram&#10;&#10;Description automatically generated">
+            <a:extLst>
+              <a:ext uri="{FF2B5EF4-FFF2-40B4-BE49-F238E27FC236}">
+                <a16:creationId xmlns:a16="http://schemas.microsoft.com/office/drawing/2014/main" id="{2E59A4BC-B2F2-4C23-8873-A2C2627D9DE6}"/>
+              </a:ext>
+            </a:extLst>
+          </p:cNvPr>
+          <p:cNvPicPr>
+            <a:picLocks noChangeAspect="1"/>
+          </p:cNvPicPr>
+          <p:nvPr/>
+        </p:nvPicPr>
+        <p:blipFill>
+          <a:blip r:embed="rId2">
+            <a:extLst>
+              <a:ext uri="{28A0092B-C50C-407E-A947-70E740481C1C}">
+                <a14:useLocalDpi xmlns:a14="http://schemas.microsoft.com/office/drawing/2010/main" val="0"/>
+              </a:ext>
+            </a:extLst>
+          </a:blip>
+          <a:stretch>
+            <a:fillRect/>
+          </a:stretch>
+        </p:blipFill>
+        <p:spPr>
+          <a:xfrm>
+            <a:off x="18495" y="4067051"/>
+            <a:ext cx="5053560" cy="2743200"/>
+          </a:xfrm>
+          <a:prstGeom prst="rect">
+            <a:avLst/>
+          </a:prstGeom>
+        </p:spPr>
+      </p:pic>
+      <p:sp>
+        <p:nvSpPr>
+          <p:cNvPr id="2" name="Title 1">
+            <a:extLst>
+              <a:ext uri="{FF2B5EF4-FFF2-40B4-BE49-F238E27FC236}">
+                <a16:creationId xmlns:a16="http://schemas.microsoft.com/office/drawing/2014/main" id="{72202210-AB4C-4E11-B62A-B7D1D0C3B6C9}"/>
+              </a:ext>
+            </a:extLst>
+          </p:cNvPr>
+          <p:cNvSpPr>
+            <a:spLocks noGrp="1"/>
+          </p:cNvSpPr>
+          <p:nvPr>
+            <p:ph type="title"/>
+          </p:nvPr>
+        </p:nvSpPr>
+        <p:spPr/>
+        <p:txBody>
+          <a:bodyPr>
+            <a:normAutofit/>
+          </a:bodyPr>
+          <a:lstStyle/>
+          <a:p>
+            <a:pPr algn="l"/>
+            <a:r>
+              <a:rPr lang="en-US" sz="3000" dirty="0"/>
+              <a:t>PVDIS_LD2</a:t>
+            </a:r>
+          </a:p>
+        </p:txBody>
+      </p:sp>
+      <p:pic>
+        <p:nvPicPr>
+          <p:cNvPr id="5" name="Content Placeholder 4" descr="Chart, histogram&#10;&#10;Description automatically generated">
+            <a:extLst>
+              <a:ext uri="{FF2B5EF4-FFF2-40B4-BE49-F238E27FC236}">
+                <a16:creationId xmlns:a16="http://schemas.microsoft.com/office/drawing/2014/main" id="{D83237C4-F8B4-40F3-B280-E4FCFAF515E6}"/>
+              </a:ext>
+            </a:extLst>
+          </p:cNvPr>
+          <p:cNvPicPr>
+            <a:picLocks noGrp="1" noChangeAspect="1"/>
+          </p:cNvPicPr>
+          <p:nvPr>
+            <p:ph idx="1"/>
+          </p:nvPr>
+        </p:nvPicPr>
+        <p:blipFill>
+          <a:blip r:embed="rId3">
+            <a:extLst>
+              <a:ext uri="{28A0092B-C50C-407E-A947-70E740481C1C}">
+                <a14:useLocalDpi xmlns:a14="http://schemas.microsoft.com/office/drawing/2010/main" val="0"/>
+              </a:ext>
+            </a:extLst>
+          </a:blip>
+          <a:stretch>
+            <a:fillRect/>
+          </a:stretch>
+        </p:blipFill>
+        <p:spPr>
+          <a:xfrm>
+            <a:off x="3962400" y="0"/>
+            <a:ext cx="5053560" cy="2743200"/>
+          </a:xfrm>
+        </p:spPr>
+      </p:pic>
+      <p:pic>
+        <p:nvPicPr>
+          <p:cNvPr id="7" name="Picture 6" descr="Chart, histogram&#10;&#10;Description automatically generated">
+            <a:extLst>
+              <a:ext uri="{FF2B5EF4-FFF2-40B4-BE49-F238E27FC236}">
+                <a16:creationId xmlns:a16="http://schemas.microsoft.com/office/drawing/2014/main" id="{F1D1C1D6-5F55-4C61-92F7-237B73481F90}"/>
+              </a:ext>
+            </a:extLst>
+          </p:cNvPr>
+          <p:cNvPicPr>
+            <a:picLocks noChangeAspect="1"/>
+          </p:cNvPicPr>
+          <p:nvPr/>
+        </p:nvPicPr>
+        <p:blipFill>
+          <a:blip r:embed="rId4">
+            <a:extLst>
+              <a:ext uri="{28A0092B-C50C-407E-A947-70E740481C1C}">
+                <a14:useLocalDpi xmlns:a14="http://schemas.microsoft.com/office/drawing/2010/main" val="0"/>
+              </a:ext>
+            </a:extLst>
+          </a:blip>
+          <a:stretch>
+            <a:fillRect/>
+          </a:stretch>
+        </p:blipFill>
+        <p:spPr>
+          <a:xfrm>
+            <a:off x="3962400" y="2816439"/>
+            <a:ext cx="5053559" cy="2743200"/>
+          </a:xfrm>
+          <a:prstGeom prst="rect">
+            <a:avLst/>
+          </a:prstGeom>
+        </p:spPr>
+      </p:pic>
+      <p:sp>
+        <p:nvSpPr>
+          <p:cNvPr id="8" name="Slide Number Placeholder 7">
+            <a:extLst>
+              <a:ext uri="{FF2B5EF4-FFF2-40B4-BE49-F238E27FC236}">
+                <a16:creationId xmlns:a16="http://schemas.microsoft.com/office/drawing/2014/main" id="{2741909E-8D80-43BA-83C0-B8B4E009960A}"/>
+              </a:ext>
+            </a:extLst>
+          </p:cNvPr>
+          <p:cNvSpPr>
+            <a:spLocks noGrp="1"/>
+          </p:cNvSpPr>
+          <p:nvPr>
+            <p:ph type="sldNum" sz="quarter" idx="12"/>
+          </p:nvPr>
+        </p:nvSpPr>
+        <p:spPr/>
+        <p:txBody>
+          <a:bodyPr/>
+          <a:lstStyle/>
+          <a:p>
+            <a:fld id="{B6F15528-21DE-4FAA-801E-634DDDAF4B2B}" type="slidenum">
+              <a:rPr lang="en-US" smtClean="0"/>
+              <a:pPr/>
+              <a:t>11</a:t>
+            </a:fld>
+            <a:endParaRPr lang="en-US"/>
+          </a:p>
+        </p:txBody>
+      </p:sp>
+    </p:spTree>
+    <p:extLst>
+      <p:ext uri="{BB962C8B-B14F-4D97-AF65-F5344CB8AC3E}">
+        <p14:creationId xmlns:p14="http://schemas.microsoft.com/office/powerpoint/2010/main" val="2211995282"/>
+      </p:ext>
+    </p:extLst>
+  </p:cSld>
+  <p:clrMapOvr>
+    <a:masterClrMapping/>
+  </p:clrMapOvr>
+</p:sld>
+</file>
+
+<file path=ppt/slides/slide12.xml><?xml version="1.0" encoding="utf-8"?>
+<p:sld xmlns:a="http://schemas.openxmlformats.org/drawingml/2006/main" xmlns:r="http://schemas.openxmlformats.org/officeDocument/2006/relationships" xmlns:p="http://schemas.openxmlformats.org/presentationml/2006/main">
+  <p:cSld>
+    <p:spTree>
+      <p:nvGrpSpPr>
+        <p:cNvPr id="1" name=""/>
+        <p:cNvGrpSpPr/>
+        <p:nvPr/>
+      </p:nvGrpSpPr>
+      <p:grpSpPr>
+        <a:xfrm>
+          <a:off x="0" y="0"/>
+          <a:ext cx="0" cy="0"/>
+          <a:chOff x="0" y="0"/>
+          <a:chExt cx="0" cy="0"/>
+        </a:xfrm>
+      </p:grpSpPr>
+      <p:sp>
+        <p:nvSpPr>
+          <p:cNvPr id="2" name="Title 1">
+            <a:extLst>
+              <a:ext uri="{FF2B5EF4-FFF2-40B4-BE49-F238E27FC236}">
+                <a16:creationId xmlns:a16="http://schemas.microsoft.com/office/drawing/2014/main" id="{72202210-AB4C-4E11-B62A-B7D1D0C3B6C9}"/>
+              </a:ext>
+            </a:extLst>
+          </p:cNvPr>
+          <p:cNvSpPr>
+            <a:spLocks noGrp="1"/>
+          </p:cNvSpPr>
+          <p:nvPr>
+            <p:ph type="title"/>
+          </p:nvPr>
+        </p:nvSpPr>
+        <p:spPr/>
+        <p:txBody>
+          <a:bodyPr>
+            <a:normAutofit/>
+          </a:bodyPr>
+          <a:lstStyle/>
+          <a:p>
+            <a:pPr algn="l"/>
+            <a:r>
+              <a:rPr lang="en-US" sz="3000" dirty="0"/>
+              <a:t>PVDIS_LD2</a:t>
+            </a:r>
+          </a:p>
+        </p:txBody>
+      </p:sp>
+      <p:pic>
+        <p:nvPicPr>
+          <p:cNvPr id="5" name="Content Placeholder 4" descr="Chart, histogram&#10;&#10;Description automatically generated">
+            <a:extLst>
+              <a:ext uri="{FF2B5EF4-FFF2-40B4-BE49-F238E27FC236}">
+                <a16:creationId xmlns:a16="http://schemas.microsoft.com/office/drawing/2014/main" id="{D83237C4-F8B4-40F3-B280-E4FCFAF515E6}"/>
+              </a:ext>
+            </a:extLst>
+          </p:cNvPr>
+          <p:cNvPicPr>
+            <a:picLocks noGrp="1" noChangeAspect="1"/>
+          </p:cNvPicPr>
+          <p:nvPr>
+            <p:ph idx="1"/>
+          </p:nvPr>
+        </p:nvPicPr>
+        <p:blipFill>
+          <a:blip r:embed="rId2">
+            <a:extLst>
+              <a:ext uri="{28A0092B-C50C-407E-A947-70E740481C1C}">
+                <a14:useLocalDpi xmlns:a14="http://schemas.microsoft.com/office/drawing/2010/main" val="0"/>
+              </a:ext>
+            </a:extLst>
+          </a:blip>
+          <a:stretch>
+            <a:fillRect/>
+          </a:stretch>
+        </p:blipFill>
+        <p:spPr>
+          <a:xfrm>
+            <a:off x="3962400" y="0"/>
+            <a:ext cx="5053560" cy="2743200"/>
+          </a:xfrm>
+        </p:spPr>
+      </p:pic>
+      <p:sp>
+        <p:nvSpPr>
+          <p:cNvPr id="8" name="Slide Number Placeholder 7">
+            <a:extLst>
+              <a:ext uri="{FF2B5EF4-FFF2-40B4-BE49-F238E27FC236}">
+                <a16:creationId xmlns:a16="http://schemas.microsoft.com/office/drawing/2014/main" id="{2741909E-8D80-43BA-83C0-B8B4E009960A}"/>
+              </a:ext>
+            </a:extLst>
+          </p:cNvPr>
+          <p:cNvSpPr>
+            <a:spLocks noGrp="1"/>
+          </p:cNvSpPr>
+          <p:nvPr>
+            <p:ph type="sldNum" sz="quarter" idx="12"/>
+          </p:nvPr>
+        </p:nvSpPr>
+        <p:spPr/>
+        <p:txBody>
+          <a:bodyPr/>
+          <a:lstStyle/>
+          <a:p>
+            <a:fld id="{B6F15528-21DE-4FAA-801E-634DDDAF4B2B}" type="slidenum">
+              <a:rPr lang="en-US" smtClean="0"/>
+              <a:pPr/>
+              <a:t>12</a:t>
+            </a:fld>
+            <a:endParaRPr lang="en-US"/>
+          </a:p>
+        </p:txBody>
+      </p:sp>
+      <p:pic>
+        <p:nvPicPr>
+          <p:cNvPr id="9" name="Picture 8">
+            <a:extLst>
+              <a:ext uri="{FF2B5EF4-FFF2-40B4-BE49-F238E27FC236}">
+                <a16:creationId xmlns:a16="http://schemas.microsoft.com/office/drawing/2014/main" id="{2CFA8BF7-0E49-4480-A829-1BF826C96923}"/>
+              </a:ext>
+            </a:extLst>
+          </p:cNvPr>
+          <p:cNvPicPr>
+            <a:picLocks noChangeAspect="1"/>
+          </p:cNvPicPr>
+          <p:nvPr/>
+        </p:nvPicPr>
+        <p:blipFill>
+          <a:blip r:embed="rId3"/>
+          <a:stretch>
+            <a:fillRect/>
+          </a:stretch>
+        </p:blipFill>
+        <p:spPr>
+          <a:xfrm>
+            <a:off x="19975" y="4113945"/>
+            <a:ext cx="5051972" cy="2743200"/>
+          </a:xfrm>
+          <a:prstGeom prst="rect">
+            <a:avLst/>
+          </a:prstGeom>
+        </p:spPr>
+      </p:pic>
+      <p:pic>
+        <p:nvPicPr>
+          <p:cNvPr id="4" name="Picture 3">
+            <a:extLst>
+              <a:ext uri="{FF2B5EF4-FFF2-40B4-BE49-F238E27FC236}">
+                <a16:creationId xmlns:a16="http://schemas.microsoft.com/office/drawing/2014/main" id="{B3CAEA64-7FFE-4967-8465-6ECD63158D8A}"/>
+              </a:ext>
+            </a:extLst>
+          </p:cNvPr>
+          <p:cNvPicPr>
+            <a:picLocks noChangeAspect="1"/>
+          </p:cNvPicPr>
+          <p:nvPr/>
+        </p:nvPicPr>
+        <p:blipFill>
+          <a:blip r:embed="rId4"/>
+          <a:stretch>
+            <a:fillRect/>
+          </a:stretch>
+        </p:blipFill>
+        <p:spPr>
+          <a:xfrm>
+            <a:off x="4038600" y="2696307"/>
+            <a:ext cx="4736066" cy="2743200"/>
+          </a:xfrm>
+          <a:prstGeom prst="rect">
+            <a:avLst/>
+          </a:prstGeom>
+        </p:spPr>
+      </p:pic>
+    </p:spTree>
+    <p:extLst>
+      <p:ext uri="{BB962C8B-B14F-4D97-AF65-F5344CB8AC3E}">
+        <p14:creationId xmlns:p14="http://schemas.microsoft.com/office/powerpoint/2010/main" val="852861027"/>
+      </p:ext>
+    </p:extLst>
   </p:cSld>
   <p:clrMapOvr>
     <a:masterClrMapping/>
@@ -5912,7 +6659,7 @@
           <p:cNvPr id="2" name="Title 1">
             <a:extLst>
               <a:ext uri="{FF2B5EF4-FFF2-40B4-BE49-F238E27FC236}">
-                <a16:creationId xmlns:a16="http://schemas.microsoft.com/office/drawing/2014/main" id="{3AA54585-9FD4-420E-B5DA-53CDC80667EC}"/>
+                <a16:creationId xmlns:a16="http://schemas.microsoft.com/office/drawing/2014/main" id="{24B0F77D-D7F9-4D8F-9CAD-E077B29CBDB1}"/>
               </a:ext>
             </a:extLst>
           </p:cNvPr>
@@ -5928,10 +6675,12 @@
           <a:bodyPr/>
           <a:lstStyle/>
           <a:p>
-            <a:r>
-              <a:rPr lang="en-US" dirty="0"/>
-              <a:t>backup</a:t>
-            </a:r>
+            <a:pPr algn="l"/>
+            <a:r>
+              <a:rPr lang="en-US" sz="4400" dirty="0"/>
+              <a:t>PVDIS_LD2</a:t>
+            </a:r>
+            <a:endParaRPr lang="en-US" dirty="0"/>
           </a:p>
         </p:txBody>
       </p:sp>
@@ -5940,7 +6689,7 @@
           <p:cNvPr id="3" name="Content Placeholder 2">
             <a:extLst>
               <a:ext uri="{FF2B5EF4-FFF2-40B4-BE49-F238E27FC236}">
-                <a16:creationId xmlns:a16="http://schemas.microsoft.com/office/drawing/2014/main" id="{30625241-2871-4E99-8610-6A0B49A92493}"/>
+                <a16:creationId xmlns:a16="http://schemas.microsoft.com/office/drawing/2014/main" id="{E686C813-851E-4DFD-8024-60B2BB762F52}"/>
               </a:ext>
             </a:extLst>
           </p:cNvPr>
@@ -5965,7 +6714,7 @@
           <p:cNvPr id="4" name="Slide Number Placeholder 3">
             <a:extLst>
               <a:ext uri="{FF2B5EF4-FFF2-40B4-BE49-F238E27FC236}">
-                <a16:creationId xmlns:a16="http://schemas.microsoft.com/office/drawing/2014/main" id="{CAAF5EB8-B67B-4F64-9FE7-51F1F13885CA}"/>
+                <a16:creationId xmlns:a16="http://schemas.microsoft.com/office/drawing/2014/main" id="{08925AE3-0507-4888-800F-A138B33AD9C5}"/>
               </a:ext>
             </a:extLst>
           </p:cNvPr>
@@ -5990,10 +6739,40 @@
           </a:p>
         </p:txBody>
       </p:sp>
+      <p:pic>
+        <p:nvPicPr>
+          <p:cNvPr id="6" name="Picture 5">
+            <a:extLst>
+              <a:ext uri="{FF2B5EF4-FFF2-40B4-BE49-F238E27FC236}">
+                <a16:creationId xmlns:a16="http://schemas.microsoft.com/office/drawing/2014/main" id="{C0205CAA-27D9-4F6D-8801-3983C7F91721}"/>
+              </a:ext>
+            </a:extLst>
+          </p:cNvPr>
+          <p:cNvPicPr>
+            <a:picLocks noChangeAspect="1"/>
+          </p:cNvPicPr>
+          <p:nvPr/>
+        </p:nvPicPr>
+        <p:blipFill>
+          <a:blip r:embed="rId2"/>
+          <a:stretch>
+            <a:fillRect/>
+          </a:stretch>
+        </p:blipFill>
+        <p:spPr>
+          <a:xfrm>
+            <a:off x="0" y="1143000"/>
+            <a:ext cx="9144000" cy="5296341"/>
+          </a:xfrm>
+          <a:prstGeom prst="rect">
+            <a:avLst/>
+          </a:prstGeom>
+        </p:spPr>
+      </p:pic>
     </p:spTree>
     <p:extLst>
       <p:ext uri="{BB962C8B-B14F-4D97-AF65-F5344CB8AC3E}">
-        <p14:creationId xmlns:p14="http://schemas.microsoft.com/office/powerpoint/2010/main" val="1388761344"/>
+        <p14:creationId xmlns:p14="http://schemas.microsoft.com/office/powerpoint/2010/main" val="4137266342"/>
       </p:ext>
     </p:extLst>
   </p:cSld>
@@ -6025,6 +6804,229 @@
           <p:cNvPr id="2" name="Title 1">
             <a:extLst>
               <a:ext uri="{FF2B5EF4-FFF2-40B4-BE49-F238E27FC236}">
+                <a16:creationId xmlns:a16="http://schemas.microsoft.com/office/drawing/2014/main" id="{C0BC2E03-6E07-480B-BCB6-51A311F797C3}"/>
+              </a:ext>
+            </a:extLst>
+          </p:cNvPr>
+          <p:cNvSpPr>
+            <a:spLocks noGrp="1"/>
+          </p:cNvSpPr>
+          <p:nvPr>
+            <p:ph type="title"/>
+          </p:nvPr>
+        </p:nvSpPr>
+        <p:spPr/>
+        <p:txBody>
+          <a:bodyPr/>
+          <a:lstStyle/>
+          <a:p>
+            <a:endParaRPr lang="en-US"/>
+          </a:p>
+        </p:txBody>
+      </p:sp>
+      <p:sp>
+        <p:nvSpPr>
+          <p:cNvPr id="3" name="Content Placeholder 2">
+            <a:extLst>
+              <a:ext uri="{FF2B5EF4-FFF2-40B4-BE49-F238E27FC236}">
+                <a16:creationId xmlns:a16="http://schemas.microsoft.com/office/drawing/2014/main" id="{928C17CC-755A-4475-9A40-C89BB33B42B1}"/>
+              </a:ext>
+            </a:extLst>
+          </p:cNvPr>
+          <p:cNvSpPr>
+            <a:spLocks noGrp="1"/>
+          </p:cNvSpPr>
+          <p:nvPr>
+            <p:ph idx="1"/>
+          </p:nvPr>
+        </p:nvSpPr>
+        <p:spPr/>
+        <p:txBody>
+          <a:bodyPr/>
+          <a:lstStyle/>
+          <a:p>
+            <a:endParaRPr lang="en-US"/>
+          </a:p>
+        </p:txBody>
+      </p:sp>
+      <p:sp>
+        <p:nvSpPr>
+          <p:cNvPr id="4" name="Slide Number Placeholder 3">
+            <a:extLst>
+              <a:ext uri="{FF2B5EF4-FFF2-40B4-BE49-F238E27FC236}">
+                <a16:creationId xmlns:a16="http://schemas.microsoft.com/office/drawing/2014/main" id="{6016EACC-A68A-4750-B108-1A850852D357}"/>
+              </a:ext>
+            </a:extLst>
+          </p:cNvPr>
+          <p:cNvSpPr>
+            <a:spLocks noGrp="1"/>
+          </p:cNvSpPr>
+          <p:nvPr>
+            <p:ph type="sldNum" sz="quarter" idx="12"/>
+          </p:nvPr>
+        </p:nvSpPr>
+        <p:spPr/>
+        <p:txBody>
+          <a:bodyPr/>
+          <a:lstStyle/>
+          <a:p>
+            <a:fld id="{B6F15528-21DE-4FAA-801E-634DDDAF4B2B}" type="slidenum">
+              <a:rPr lang="en-US" smtClean="0"/>
+              <a:pPr/>
+              <a:t>7</a:t>
+            </a:fld>
+            <a:endParaRPr lang="en-US"/>
+          </a:p>
+        </p:txBody>
+      </p:sp>
+    </p:spTree>
+    <p:extLst>
+      <p:ext uri="{BB962C8B-B14F-4D97-AF65-F5344CB8AC3E}">
+        <p14:creationId xmlns:p14="http://schemas.microsoft.com/office/powerpoint/2010/main" val="3947213567"/>
+      </p:ext>
+    </p:extLst>
+  </p:cSld>
+  <p:clrMapOvr>
+    <a:masterClrMapping/>
+  </p:clrMapOvr>
+</p:sld>
+</file>
+
+<file path=ppt/slides/slide8.xml><?xml version="1.0" encoding="utf-8"?>
+<p:sld xmlns:a="http://schemas.openxmlformats.org/drawingml/2006/main" xmlns:r="http://schemas.openxmlformats.org/officeDocument/2006/relationships" xmlns:p="http://schemas.openxmlformats.org/presentationml/2006/main">
+  <p:cSld>
+    <p:spTree>
+      <p:nvGrpSpPr>
+        <p:cNvPr id="1" name=""/>
+        <p:cNvGrpSpPr/>
+        <p:nvPr/>
+      </p:nvGrpSpPr>
+      <p:grpSpPr>
+        <a:xfrm>
+          <a:off x="0" y="0"/>
+          <a:ext cx="0" cy="0"/>
+          <a:chOff x="0" y="0"/>
+          <a:chExt cx="0" cy="0"/>
+        </a:xfrm>
+      </p:grpSpPr>
+      <p:sp>
+        <p:nvSpPr>
+          <p:cNvPr id="2" name="Title 1">
+            <a:extLst>
+              <a:ext uri="{FF2B5EF4-FFF2-40B4-BE49-F238E27FC236}">
+                <a16:creationId xmlns:a16="http://schemas.microsoft.com/office/drawing/2014/main" id="{3AA54585-9FD4-420E-B5DA-53CDC80667EC}"/>
+              </a:ext>
+            </a:extLst>
+          </p:cNvPr>
+          <p:cNvSpPr>
+            <a:spLocks noGrp="1"/>
+          </p:cNvSpPr>
+          <p:nvPr>
+            <p:ph type="title"/>
+          </p:nvPr>
+        </p:nvSpPr>
+        <p:spPr/>
+        <p:txBody>
+          <a:bodyPr/>
+          <a:lstStyle/>
+          <a:p>
+            <a:r>
+              <a:rPr lang="en-US" dirty="0"/>
+              <a:t>backup</a:t>
+            </a:r>
+          </a:p>
+        </p:txBody>
+      </p:sp>
+      <p:sp>
+        <p:nvSpPr>
+          <p:cNvPr id="3" name="Content Placeholder 2">
+            <a:extLst>
+              <a:ext uri="{FF2B5EF4-FFF2-40B4-BE49-F238E27FC236}">
+                <a16:creationId xmlns:a16="http://schemas.microsoft.com/office/drawing/2014/main" id="{30625241-2871-4E99-8610-6A0B49A92493}"/>
+              </a:ext>
+            </a:extLst>
+          </p:cNvPr>
+          <p:cNvSpPr>
+            <a:spLocks noGrp="1"/>
+          </p:cNvSpPr>
+          <p:nvPr>
+            <p:ph idx="1"/>
+          </p:nvPr>
+        </p:nvSpPr>
+        <p:spPr/>
+        <p:txBody>
+          <a:bodyPr/>
+          <a:lstStyle/>
+          <a:p>
+            <a:endParaRPr lang="en-US"/>
+          </a:p>
+        </p:txBody>
+      </p:sp>
+      <p:sp>
+        <p:nvSpPr>
+          <p:cNvPr id="4" name="Slide Number Placeholder 3">
+            <a:extLst>
+              <a:ext uri="{FF2B5EF4-FFF2-40B4-BE49-F238E27FC236}">
+                <a16:creationId xmlns:a16="http://schemas.microsoft.com/office/drawing/2014/main" id="{CAAF5EB8-B67B-4F64-9FE7-51F1F13885CA}"/>
+              </a:ext>
+            </a:extLst>
+          </p:cNvPr>
+          <p:cNvSpPr>
+            <a:spLocks noGrp="1"/>
+          </p:cNvSpPr>
+          <p:nvPr>
+            <p:ph type="sldNum" sz="quarter" idx="12"/>
+          </p:nvPr>
+        </p:nvSpPr>
+        <p:spPr/>
+        <p:txBody>
+          <a:bodyPr/>
+          <a:lstStyle/>
+          <a:p>
+            <a:fld id="{B6F15528-21DE-4FAA-801E-634DDDAF4B2B}" type="slidenum">
+              <a:rPr lang="en-US" smtClean="0"/>
+              <a:pPr/>
+              <a:t>8</a:t>
+            </a:fld>
+            <a:endParaRPr lang="en-US"/>
+          </a:p>
+        </p:txBody>
+      </p:sp>
+    </p:spTree>
+    <p:extLst>
+      <p:ext uri="{BB962C8B-B14F-4D97-AF65-F5344CB8AC3E}">
+        <p14:creationId xmlns:p14="http://schemas.microsoft.com/office/powerpoint/2010/main" val="1388761344"/>
+      </p:ext>
+    </p:extLst>
+  </p:cSld>
+  <p:clrMapOvr>
+    <a:masterClrMapping/>
+  </p:clrMapOvr>
+</p:sld>
+</file>
+
+<file path=ppt/slides/slide9.xml><?xml version="1.0" encoding="utf-8"?>
+<p:sld xmlns:a="http://schemas.openxmlformats.org/drawingml/2006/main" xmlns:r="http://schemas.openxmlformats.org/officeDocument/2006/relationships" xmlns:p="http://schemas.openxmlformats.org/presentationml/2006/main">
+  <p:cSld>
+    <p:spTree>
+      <p:nvGrpSpPr>
+        <p:cNvPr id="1" name=""/>
+        <p:cNvGrpSpPr/>
+        <p:nvPr/>
+      </p:nvGrpSpPr>
+      <p:grpSpPr>
+        <a:xfrm>
+          <a:off x="0" y="0"/>
+          <a:ext cx="0" cy="0"/>
+          <a:chOff x="0" y="0"/>
+          <a:chExt cx="0" cy="0"/>
+        </a:xfrm>
+      </p:grpSpPr>
+      <p:sp>
+        <p:nvSpPr>
+          <p:cNvPr id="2" name="Title 1">
+            <a:extLst>
+              <a:ext uri="{FF2B5EF4-FFF2-40B4-BE49-F238E27FC236}">
                 <a16:creationId xmlns:a16="http://schemas.microsoft.com/office/drawing/2014/main" id="{C50639C4-8FB3-4E37-9A3E-1EF29E442F41}"/>
               </a:ext>
             </a:extLst>
@@ -6104,7 +7106,7 @@
             <a:fld id="{B6F15528-21DE-4FAA-801E-634DDDAF4B2B}" type="slidenum">
               <a:rPr lang="en-US" smtClean="0"/>
               <a:pPr/>
-              <a:t>7</a:t>
+              <a:t>9</a:t>
             </a:fld>
             <a:endParaRPr lang="en-US"/>
           </a:p>
@@ -6238,448 +7240,6 @@
     <p:extLst>
       <p:ext uri="{BB962C8B-B14F-4D97-AF65-F5344CB8AC3E}">
         <p14:creationId xmlns:p14="http://schemas.microsoft.com/office/powerpoint/2010/main" val="1119756300"/>
-      </p:ext>
-    </p:extLst>
-  </p:cSld>
-  <p:clrMapOvr>
-    <a:masterClrMapping/>
-  </p:clrMapOvr>
-</p:sld>
-</file>
-
-<file path=ppt/slides/slide8.xml><?xml version="1.0" encoding="utf-8"?>
-<p:sld xmlns:a="http://schemas.openxmlformats.org/drawingml/2006/main" xmlns:r="http://schemas.openxmlformats.org/officeDocument/2006/relationships" xmlns:p="http://schemas.openxmlformats.org/presentationml/2006/main">
-  <p:cSld>
-    <p:spTree>
-      <p:nvGrpSpPr>
-        <p:cNvPr id="1" name=""/>
-        <p:cNvGrpSpPr/>
-        <p:nvPr/>
-      </p:nvGrpSpPr>
-      <p:grpSpPr>
-        <a:xfrm>
-          <a:off x="0" y="0"/>
-          <a:ext cx="0" cy="0"/>
-          <a:chOff x="0" y="0"/>
-          <a:chExt cx="0" cy="0"/>
-        </a:xfrm>
-      </p:grpSpPr>
-      <p:pic>
-        <p:nvPicPr>
-          <p:cNvPr id="10" name="Content Placeholder 5" descr="Chart, histogram&#10;&#10;Description automatically generated">
-            <a:extLst>
-              <a:ext uri="{FF2B5EF4-FFF2-40B4-BE49-F238E27FC236}">
-                <a16:creationId xmlns:a16="http://schemas.microsoft.com/office/drawing/2014/main" id="{8BEF43EC-B118-4467-AC82-C109C694031E}"/>
-              </a:ext>
-            </a:extLst>
-          </p:cNvPr>
-          <p:cNvPicPr>
-            <a:picLocks noChangeAspect="1"/>
-          </p:cNvPicPr>
-          <p:nvPr/>
-        </p:nvPicPr>
-        <p:blipFill>
-          <a:blip r:embed="rId2">
-            <a:extLst>
-              <a:ext uri="{28A0092B-C50C-407E-A947-70E740481C1C}">
-                <a14:useLocalDpi xmlns:a14="http://schemas.microsoft.com/office/drawing/2010/main" val="0"/>
-              </a:ext>
-            </a:extLst>
-          </a:blip>
-          <a:stretch>
-            <a:fillRect/>
-          </a:stretch>
-        </p:blipFill>
-        <p:spPr>
-          <a:xfrm>
-            <a:off x="0" y="4114800"/>
-            <a:ext cx="5053560" cy="2743200"/>
-          </a:xfrm>
-          <a:prstGeom prst="rect">
-            <a:avLst/>
-          </a:prstGeom>
-        </p:spPr>
-      </p:pic>
-      <p:sp>
-        <p:nvSpPr>
-          <p:cNvPr id="2" name="Title 1">
-            <a:extLst>
-              <a:ext uri="{FF2B5EF4-FFF2-40B4-BE49-F238E27FC236}">
-                <a16:creationId xmlns:a16="http://schemas.microsoft.com/office/drawing/2014/main" id="{3D2769D3-16C4-4C71-8FD3-2B57E6DCFB90}"/>
-              </a:ext>
-            </a:extLst>
-          </p:cNvPr>
-          <p:cNvSpPr>
-            <a:spLocks noGrp="1"/>
-          </p:cNvSpPr>
-          <p:nvPr>
-            <p:ph type="title"/>
-          </p:nvPr>
-        </p:nvSpPr>
-        <p:spPr/>
-        <p:txBody>
-          <a:bodyPr/>
-          <a:lstStyle/>
-          <a:p>
-            <a:endParaRPr lang="en-US"/>
-          </a:p>
-        </p:txBody>
-      </p:sp>
-      <p:pic>
-        <p:nvPicPr>
-          <p:cNvPr id="6" name="Content Placeholder 5" descr="Chart, histogram&#10;&#10;Description automatically generated">
-            <a:extLst>
-              <a:ext uri="{FF2B5EF4-FFF2-40B4-BE49-F238E27FC236}">
-                <a16:creationId xmlns:a16="http://schemas.microsoft.com/office/drawing/2014/main" id="{F872EA14-4EC5-4B8C-B6CF-A0CC8E8733CB}"/>
-              </a:ext>
-            </a:extLst>
-          </p:cNvPr>
-          <p:cNvPicPr>
-            <a:picLocks noGrp="1" noChangeAspect="1"/>
-          </p:cNvPicPr>
-          <p:nvPr>
-            <p:ph idx="1"/>
-          </p:nvPr>
-        </p:nvPicPr>
-        <p:blipFill>
-          <a:blip r:embed="rId3">
-            <a:extLst>
-              <a:ext uri="{28A0092B-C50C-407E-A947-70E740481C1C}">
-                <a14:useLocalDpi xmlns:a14="http://schemas.microsoft.com/office/drawing/2010/main" val="0"/>
-              </a:ext>
-            </a:extLst>
-          </a:blip>
-          <a:stretch>
-            <a:fillRect/>
-          </a:stretch>
-        </p:blipFill>
-        <p:spPr>
-          <a:xfrm>
-            <a:off x="3938038" y="96376"/>
-            <a:ext cx="5053561" cy="2743200"/>
-          </a:xfrm>
-        </p:spPr>
-      </p:pic>
-      <p:sp>
-        <p:nvSpPr>
-          <p:cNvPr id="4" name="Slide Number Placeholder 3">
-            <a:extLst>
-              <a:ext uri="{FF2B5EF4-FFF2-40B4-BE49-F238E27FC236}">
-                <a16:creationId xmlns:a16="http://schemas.microsoft.com/office/drawing/2014/main" id="{74286B5F-9139-4B3F-B252-6B0D6CE6E796}"/>
-              </a:ext>
-            </a:extLst>
-          </p:cNvPr>
-          <p:cNvSpPr>
-            <a:spLocks noGrp="1"/>
-          </p:cNvSpPr>
-          <p:nvPr>
-            <p:ph type="sldNum" sz="quarter" idx="12"/>
-          </p:nvPr>
-        </p:nvSpPr>
-        <p:spPr/>
-        <p:txBody>
-          <a:bodyPr/>
-          <a:lstStyle/>
-          <a:p>
-            <a:fld id="{B6F15528-21DE-4FAA-801E-634DDDAF4B2B}" type="slidenum">
-              <a:rPr lang="en-US" smtClean="0"/>
-              <a:pPr/>
-              <a:t>8</a:t>
-            </a:fld>
-            <a:endParaRPr lang="en-US"/>
-          </a:p>
-        </p:txBody>
-      </p:sp>
-      <p:pic>
-        <p:nvPicPr>
-          <p:cNvPr id="8" name="Picture 7" descr="Chart, histogram&#10;&#10;Description automatically generated">
-            <a:extLst>
-              <a:ext uri="{FF2B5EF4-FFF2-40B4-BE49-F238E27FC236}">
-                <a16:creationId xmlns:a16="http://schemas.microsoft.com/office/drawing/2014/main" id="{91164645-200C-464F-BF1B-25F50D95DB90}"/>
-              </a:ext>
-            </a:extLst>
-          </p:cNvPr>
-          <p:cNvPicPr>
-            <a:picLocks noChangeAspect="1"/>
-          </p:cNvPicPr>
-          <p:nvPr/>
-        </p:nvPicPr>
-        <p:blipFill>
-          <a:blip r:embed="rId4">
-            <a:extLst>
-              <a:ext uri="{28A0092B-C50C-407E-A947-70E740481C1C}">
-                <a14:useLocalDpi xmlns:a14="http://schemas.microsoft.com/office/drawing/2010/main" val="0"/>
-              </a:ext>
-            </a:extLst>
-          </a:blip>
-          <a:stretch>
-            <a:fillRect/>
-          </a:stretch>
-        </p:blipFill>
-        <p:spPr>
-          <a:xfrm>
-            <a:off x="3938040" y="2839576"/>
-            <a:ext cx="5053559" cy="2743200"/>
-          </a:xfrm>
-          <a:prstGeom prst="rect">
-            <a:avLst/>
-          </a:prstGeom>
-        </p:spPr>
-      </p:pic>
-      <p:sp>
-        <p:nvSpPr>
-          <p:cNvPr id="9" name="Title 1">
-            <a:extLst>
-              <a:ext uri="{FF2B5EF4-FFF2-40B4-BE49-F238E27FC236}">
-                <a16:creationId xmlns:a16="http://schemas.microsoft.com/office/drawing/2014/main" id="{79418FCD-7505-4F2E-BE7F-0FE842BCB360}"/>
-              </a:ext>
-            </a:extLst>
-          </p:cNvPr>
-          <p:cNvSpPr txBox="1">
-            <a:spLocks/>
-          </p:cNvSpPr>
-          <p:nvPr/>
-        </p:nvSpPr>
-        <p:spPr>
-          <a:xfrm>
-            <a:off x="609600" y="427038"/>
-            <a:ext cx="8229600" cy="1143000"/>
-          </a:xfrm>
-          <a:prstGeom prst="rect">
-            <a:avLst/>
-          </a:prstGeom>
-        </p:spPr>
-        <p:txBody>
-          <a:bodyPr vert="horz" lIns="91440" tIns="45720" rIns="91440" bIns="45720" rtlCol="0" anchor="ctr">
-            <a:normAutofit/>
-          </a:bodyPr>
-          <a:lstStyle>
-            <a:lvl1pPr algn="ctr" defTabSz="914400" rtl="0" eaLnBrk="1" latinLnBrk="0" hangingPunct="1">
-              <a:spcBef>
-                <a:spcPct val="0"/>
-              </a:spcBef>
-              <a:buNone/>
-              <a:defRPr sz="4400" kern="1200">
-                <a:solidFill>
-                  <a:schemeClr val="tx1"/>
-                </a:solidFill>
-                <a:latin typeface="+mj-lt"/>
-                <a:ea typeface="+mj-ea"/>
-                <a:cs typeface="+mj-cs"/>
-              </a:defRPr>
-            </a:lvl1pPr>
-          </a:lstStyle>
-          <a:p>
-            <a:pPr algn="l"/>
-            <a:r>
-              <a:rPr lang="en-US" sz="3000" dirty="0"/>
-              <a:t>JPsi_LH2</a:t>
-            </a:r>
-          </a:p>
-        </p:txBody>
-      </p:sp>
-    </p:spTree>
-    <p:extLst>
-      <p:ext uri="{BB962C8B-B14F-4D97-AF65-F5344CB8AC3E}">
-        <p14:creationId xmlns:p14="http://schemas.microsoft.com/office/powerpoint/2010/main" val="3660164986"/>
-      </p:ext>
-    </p:extLst>
-  </p:cSld>
-  <p:clrMapOvr>
-    <a:masterClrMapping/>
-  </p:clrMapOvr>
-</p:sld>
-</file>
-
-<file path=ppt/slides/slide9.xml><?xml version="1.0" encoding="utf-8"?>
-<p:sld xmlns:a="http://schemas.openxmlformats.org/drawingml/2006/main" xmlns:r="http://schemas.openxmlformats.org/officeDocument/2006/relationships" xmlns:p="http://schemas.openxmlformats.org/presentationml/2006/main">
-  <p:cSld>
-    <p:spTree>
-      <p:nvGrpSpPr>
-        <p:cNvPr id="1" name=""/>
-        <p:cNvGrpSpPr/>
-        <p:nvPr/>
-      </p:nvGrpSpPr>
-      <p:grpSpPr>
-        <a:xfrm>
-          <a:off x="0" y="0"/>
-          <a:ext cx="0" cy="0"/>
-          <a:chOff x="0" y="0"/>
-          <a:chExt cx="0" cy="0"/>
-        </a:xfrm>
-      </p:grpSpPr>
-      <p:pic>
-        <p:nvPicPr>
-          <p:cNvPr id="6" name="Content Placeholder 5" descr="Chart, histogram&#10;&#10;Description automatically generated">
-            <a:extLst>
-              <a:ext uri="{FF2B5EF4-FFF2-40B4-BE49-F238E27FC236}">
-                <a16:creationId xmlns:a16="http://schemas.microsoft.com/office/drawing/2014/main" id="{2E59A4BC-B2F2-4C23-8873-A2C2627D9DE6}"/>
-              </a:ext>
-            </a:extLst>
-          </p:cNvPr>
-          <p:cNvPicPr>
-            <a:picLocks noChangeAspect="1"/>
-          </p:cNvPicPr>
-          <p:nvPr/>
-        </p:nvPicPr>
-        <p:blipFill>
-          <a:blip r:embed="rId2">
-            <a:extLst>
-              <a:ext uri="{28A0092B-C50C-407E-A947-70E740481C1C}">
-                <a14:useLocalDpi xmlns:a14="http://schemas.microsoft.com/office/drawing/2010/main" val="0"/>
-              </a:ext>
-            </a:extLst>
-          </a:blip>
-          <a:stretch>
-            <a:fillRect/>
-          </a:stretch>
-        </p:blipFill>
-        <p:spPr>
-          <a:xfrm>
-            <a:off x="18495" y="4067051"/>
-            <a:ext cx="5053560" cy="2743200"/>
-          </a:xfrm>
-          <a:prstGeom prst="rect">
-            <a:avLst/>
-          </a:prstGeom>
-        </p:spPr>
-      </p:pic>
-      <p:sp>
-        <p:nvSpPr>
-          <p:cNvPr id="2" name="Title 1">
-            <a:extLst>
-              <a:ext uri="{FF2B5EF4-FFF2-40B4-BE49-F238E27FC236}">
-                <a16:creationId xmlns:a16="http://schemas.microsoft.com/office/drawing/2014/main" id="{72202210-AB4C-4E11-B62A-B7D1D0C3B6C9}"/>
-              </a:ext>
-            </a:extLst>
-          </p:cNvPr>
-          <p:cNvSpPr>
-            <a:spLocks noGrp="1"/>
-          </p:cNvSpPr>
-          <p:nvPr>
-            <p:ph type="title"/>
-          </p:nvPr>
-        </p:nvSpPr>
-        <p:spPr/>
-        <p:txBody>
-          <a:bodyPr>
-            <a:normAutofit/>
-          </a:bodyPr>
-          <a:lstStyle/>
-          <a:p>
-            <a:pPr algn="l"/>
-            <a:r>
-              <a:rPr lang="en-US" sz="3000" dirty="0"/>
-              <a:t>PVDIS_LD2</a:t>
-            </a:r>
-          </a:p>
-        </p:txBody>
-      </p:sp>
-      <p:pic>
-        <p:nvPicPr>
-          <p:cNvPr id="5" name="Content Placeholder 4" descr="Chart, histogram&#10;&#10;Description automatically generated">
-            <a:extLst>
-              <a:ext uri="{FF2B5EF4-FFF2-40B4-BE49-F238E27FC236}">
-                <a16:creationId xmlns:a16="http://schemas.microsoft.com/office/drawing/2014/main" id="{D83237C4-F8B4-40F3-B280-E4FCFAF515E6}"/>
-              </a:ext>
-            </a:extLst>
-          </p:cNvPr>
-          <p:cNvPicPr>
-            <a:picLocks noGrp="1" noChangeAspect="1"/>
-          </p:cNvPicPr>
-          <p:nvPr>
-            <p:ph idx="1"/>
-          </p:nvPr>
-        </p:nvPicPr>
-        <p:blipFill>
-          <a:blip r:embed="rId3">
-            <a:extLst>
-              <a:ext uri="{28A0092B-C50C-407E-A947-70E740481C1C}">
-                <a14:useLocalDpi xmlns:a14="http://schemas.microsoft.com/office/drawing/2010/main" val="0"/>
-              </a:ext>
-            </a:extLst>
-          </a:blip>
-          <a:stretch>
-            <a:fillRect/>
-          </a:stretch>
-        </p:blipFill>
-        <p:spPr>
-          <a:xfrm>
-            <a:off x="3962400" y="0"/>
-            <a:ext cx="5053560" cy="2743200"/>
-          </a:xfrm>
-        </p:spPr>
-      </p:pic>
-      <p:pic>
-        <p:nvPicPr>
-          <p:cNvPr id="7" name="Picture 6" descr="Chart, histogram&#10;&#10;Description automatically generated">
-            <a:extLst>
-              <a:ext uri="{FF2B5EF4-FFF2-40B4-BE49-F238E27FC236}">
-                <a16:creationId xmlns:a16="http://schemas.microsoft.com/office/drawing/2014/main" id="{F1D1C1D6-5F55-4C61-92F7-237B73481F90}"/>
-              </a:ext>
-            </a:extLst>
-          </p:cNvPr>
-          <p:cNvPicPr>
-            <a:picLocks noChangeAspect="1"/>
-          </p:cNvPicPr>
-          <p:nvPr/>
-        </p:nvPicPr>
-        <p:blipFill>
-          <a:blip r:embed="rId4">
-            <a:extLst>
-              <a:ext uri="{28A0092B-C50C-407E-A947-70E740481C1C}">
-                <a14:useLocalDpi xmlns:a14="http://schemas.microsoft.com/office/drawing/2010/main" val="0"/>
-              </a:ext>
-            </a:extLst>
-          </a:blip>
-          <a:stretch>
-            <a:fillRect/>
-          </a:stretch>
-        </p:blipFill>
-        <p:spPr>
-          <a:xfrm>
-            <a:off x="3962400" y="2816439"/>
-            <a:ext cx="5053559" cy="2743200"/>
-          </a:xfrm>
-          <a:prstGeom prst="rect">
-            <a:avLst/>
-          </a:prstGeom>
-        </p:spPr>
-      </p:pic>
-      <p:sp>
-        <p:nvSpPr>
-          <p:cNvPr id="8" name="Slide Number Placeholder 7">
-            <a:extLst>
-              <a:ext uri="{FF2B5EF4-FFF2-40B4-BE49-F238E27FC236}">
-                <a16:creationId xmlns:a16="http://schemas.microsoft.com/office/drawing/2014/main" id="{2741909E-8D80-43BA-83C0-B8B4E009960A}"/>
-              </a:ext>
-            </a:extLst>
-          </p:cNvPr>
-          <p:cNvSpPr>
-            <a:spLocks noGrp="1"/>
-          </p:cNvSpPr>
-          <p:nvPr>
-            <p:ph type="sldNum" sz="quarter" idx="12"/>
-          </p:nvPr>
-        </p:nvSpPr>
-        <p:spPr/>
-        <p:txBody>
-          <a:bodyPr/>
-          <a:lstStyle/>
-          <a:p>
-            <a:fld id="{B6F15528-21DE-4FAA-801E-634DDDAF4B2B}" type="slidenum">
-              <a:rPr lang="en-US" smtClean="0"/>
-              <a:pPr/>
-              <a:t>9</a:t>
-            </a:fld>
-            <a:endParaRPr lang="en-US"/>
-          </a:p>
-        </p:txBody>
-      </p:sp>
-    </p:spTree>
-    <p:extLst>
-      <p:ext uri="{BB962C8B-B14F-4D97-AF65-F5344CB8AC3E}">
-        <p14:creationId xmlns:p14="http://schemas.microsoft.com/office/powerpoint/2010/main" val="2211995282"/>
       </p:ext>
     </p:extLst>
   </p:cSld>

</xml_diff>

<commit_message>
add Q2x plot and proton
</commit_message>
<xml_diff>
--- a/analysis/pid/compare_e_pibggen_result_20200129/solid_pie_zwzhao_20210129.pptx
+++ b/analysis/pid/compare_e_pibggen_result_20200129/solid_pie_zwzhao_20210129.pptx
@@ -5,10 +5,10 @@
     <p:sldMasterId id="2147483648" r:id="rId1"/>
   </p:sldMasterIdLst>
   <p:notesMasterIdLst>
-    <p:notesMasterId r:id="rId14"/>
+    <p:notesMasterId r:id="rId18"/>
   </p:notesMasterIdLst>
   <p:handoutMasterIdLst>
-    <p:handoutMasterId r:id="rId15"/>
+    <p:handoutMasterId r:id="rId19"/>
   </p:handoutMasterIdLst>
   <p:sldIdLst>
     <p:sldId id="256" r:id="rId2"/>
@@ -17,22 +17,26 @@
     <p:sldId id="305" r:id="rId5"/>
     <p:sldId id="301" r:id="rId6"/>
     <p:sldId id="310" r:id="rId7"/>
-    <p:sldId id="308" r:id="rId8"/>
-    <p:sldId id="306" r:id="rId9"/>
-    <p:sldId id="302" r:id="rId10"/>
-    <p:sldId id="304" r:id="rId11"/>
-    <p:sldId id="300" r:id="rId12"/>
-    <p:sldId id="309" r:id="rId13"/>
+    <p:sldId id="314" r:id="rId8"/>
+    <p:sldId id="313" r:id="rId9"/>
+    <p:sldId id="315" r:id="rId10"/>
+    <p:sldId id="316" r:id="rId11"/>
+    <p:sldId id="312" r:id="rId12"/>
+    <p:sldId id="306" r:id="rId13"/>
+    <p:sldId id="302" r:id="rId14"/>
+    <p:sldId id="304" r:id="rId15"/>
+    <p:sldId id="300" r:id="rId16"/>
+    <p:sldId id="309" r:id="rId17"/>
   </p:sldIdLst>
   <p:sldSz cx="9144000" cy="6858000" type="screen4x3"/>
   <p:notesSz cx="6858000" cy="9144000"/>
   <p:embeddedFontLst>
     <p:embeddedFont>
       <p:font typeface="Calibri" panose="020F0502020204030204" pitchFamily="34" charset="0"/>
-      <p:regular r:id="rId16"/>
-      <p:bold r:id="rId17"/>
-      <p:italic r:id="rId18"/>
-      <p:boldItalic r:id="rId19"/>
+      <p:regular r:id="rId20"/>
+      <p:bold r:id="rId21"/>
+      <p:italic r:id="rId22"/>
+      <p:boldItalic r:id="rId23"/>
     </p:embeddedFont>
   </p:embeddedFontLst>
   <p:defaultTextStyle>
@@ -260,6 +264,160 @@
     </pc:docChg>
   </pc:docChgLst>
   <pc:docChgLst>
+    <pc:chgData name="zhiwen zhao" userId="bc03072ab7912b87" providerId="LiveId" clId="{26DA0E79-5854-4EEF-B552-A5E11B9E83F1}"/>
+    <pc:docChg chg="custSel addSld delSld modSld sldOrd">
+      <pc:chgData name="zhiwen zhao" userId="bc03072ab7912b87" providerId="LiveId" clId="{26DA0E79-5854-4EEF-B552-A5E11B9E83F1}" dt="2021-04-08T02:05:06.700" v="22" actId="1076"/>
+      <pc:docMkLst>
+        <pc:docMk/>
+      </pc:docMkLst>
+      <pc:sldChg chg="del">
+        <pc:chgData name="zhiwen zhao" userId="bc03072ab7912b87" providerId="LiveId" clId="{26DA0E79-5854-4EEF-B552-A5E11B9E83F1}" dt="2021-04-08T01:53:09.531" v="0" actId="47"/>
+        <pc:sldMkLst>
+          <pc:docMk/>
+          <pc:sldMk cId="3947213567" sldId="308"/>
+        </pc:sldMkLst>
+      </pc:sldChg>
+      <pc:sldChg chg="new del">
+        <pc:chgData name="zhiwen zhao" userId="bc03072ab7912b87" providerId="LiveId" clId="{26DA0E79-5854-4EEF-B552-A5E11B9E83F1}" dt="2021-04-08T02:01:46.719" v="3" actId="47"/>
+        <pc:sldMkLst>
+          <pc:docMk/>
+          <pc:sldMk cId="3978234343" sldId="311"/>
+        </pc:sldMkLst>
+      </pc:sldChg>
+      <pc:sldChg chg="delSp add mod">
+        <pc:chgData name="zhiwen zhao" userId="bc03072ab7912b87" providerId="LiveId" clId="{26DA0E79-5854-4EEF-B552-A5E11B9E83F1}" dt="2021-04-08T02:03:23.953" v="4" actId="478"/>
+        <pc:sldMkLst>
+          <pc:docMk/>
+          <pc:sldMk cId="3679008378" sldId="312"/>
+        </pc:sldMkLst>
+        <pc:picChg chg="del">
+          <ac:chgData name="zhiwen zhao" userId="bc03072ab7912b87" providerId="LiveId" clId="{26DA0E79-5854-4EEF-B552-A5E11B9E83F1}" dt="2021-04-08T02:03:23.953" v="4" actId="478"/>
+          <ac:picMkLst>
+            <pc:docMk/>
+            <pc:sldMk cId="3679008378" sldId="312"/>
+            <ac:picMk id="6" creationId="{C0205CAA-27D9-4F6D-8801-3983C7F91721}"/>
+          </ac:picMkLst>
+        </pc:picChg>
+      </pc:sldChg>
+      <pc:sldChg chg="addSp delSp modSp new mod ord">
+        <pc:chgData name="zhiwen zhao" userId="bc03072ab7912b87" providerId="LiveId" clId="{26DA0E79-5854-4EEF-B552-A5E11B9E83F1}" dt="2021-04-08T02:04:27.856" v="14"/>
+        <pc:sldMkLst>
+          <pc:docMk/>
+          <pc:sldMk cId="3418121055" sldId="313"/>
+        </pc:sldMkLst>
+        <pc:spChg chg="del">
+          <ac:chgData name="zhiwen zhao" userId="bc03072ab7912b87" providerId="LiveId" clId="{26DA0E79-5854-4EEF-B552-A5E11B9E83F1}" dt="2021-04-08T02:04:27.856" v="14"/>
+          <ac:spMkLst>
+            <pc:docMk/>
+            <pc:sldMk cId="3418121055" sldId="313"/>
+            <ac:spMk id="2" creationId="{43514F9A-4A4B-4A20-81FE-71519FE6A7BF}"/>
+          </ac:spMkLst>
+        </pc:spChg>
+        <pc:spChg chg="add mod">
+          <ac:chgData name="zhiwen zhao" userId="bc03072ab7912b87" providerId="LiveId" clId="{26DA0E79-5854-4EEF-B552-A5E11B9E83F1}" dt="2021-04-08T02:04:27.856" v="14"/>
+          <ac:spMkLst>
+            <pc:docMk/>
+            <pc:sldMk cId="3418121055" sldId="313"/>
+            <ac:spMk id="7" creationId="{83079509-72C4-4A85-BF39-20A3C3A5A2DD}"/>
+          </ac:spMkLst>
+        </pc:spChg>
+        <pc:picChg chg="add mod">
+          <ac:chgData name="zhiwen zhao" userId="bc03072ab7912b87" providerId="LiveId" clId="{26DA0E79-5854-4EEF-B552-A5E11B9E83F1}" dt="2021-04-08T02:04:26.364" v="13" actId="1076"/>
+          <ac:picMkLst>
+            <pc:docMk/>
+            <pc:sldMk cId="3418121055" sldId="313"/>
+            <ac:picMk id="6" creationId="{7105C106-59B0-42F7-80C1-EA5E05C50946}"/>
+          </ac:picMkLst>
+        </pc:picChg>
+      </pc:sldChg>
+      <pc:sldChg chg="addSp modSp new mod">
+        <pc:chgData name="zhiwen zhao" userId="bc03072ab7912b87" providerId="LiveId" clId="{26DA0E79-5854-4EEF-B552-A5E11B9E83F1}" dt="2021-04-08T02:04:20.931" v="12" actId="1076"/>
+        <pc:sldMkLst>
+          <pc:docMk/>
+          <pc:sldMk cId="1983790762" sldId="314"/>
+        </pc:sldMkLst>
+        <pc:spChg chg="add mod">
+          <ac:chgData name="zhiwen zhao" userId="bc03072ab7912b87" providerId="LiveId" clId="{26DA0E79-5854-4EEF-B552-A5E11B9E83F1}" dt="2021-04-08T02:04:16.455" v="11"/>
+          <ac:spMkLst>
+            <pc:docMk/>
+            <pc:sldMk cId="1983790762" sldId="314"/>
+            <ac:spMk id="7" creationId="{1C64E783-C974-41C2-B250-943D17BFD230}"/>
+          </ac:spMkLst>
+        </pc:spChg>
+        <pc:picChg chg="add mod">
+          <ac:chgData name="zhiwen zhao" userId="bc03072ab7912b87" providerId="LiveId" clId="{26DA0E79-5854-4EEF-B552-A5E11B9E83F1}" dt="2021-04-08T02:04:20.931" v="12" actId="1076"/>
+          <ac:picMkLst>
+            <pc:docMk/>
+            <pc:sldMk cId="1983790762" sldId="314"/>
+            <ac:picMk id="6" creationId="{1B607094-1470-412E-8398-467A909DD160}"/>
+          </ac:picMkLst>
+        </pc:picChg>
+      </pc:sldChg>
+      <pc:sldChg chg="addSp delSp modSp new mod">
+        <pc:chgData name="zhiwen zhao" userId="bc03072ab7912b87" providerId="LiveId" clId="{26DA0E79-5854-4EEF-B552-A5E11B9E83F1}" dt="2021-04-08T02:05:06.700" v="22" actId="1076"/>
+        <pc:sldMkLst>
+          <pc:docMk/>
+          <pc:sldMk cId="2518009482" sldId="315"/>
+        </pc:sldMkLst>
+        <pc:spChg chg="del">
+          <ac:chgData name="zhiwen zhao" userId="bc03072ab7912b87" providerId="LiveId" clId="{26DA0E79-5854-4EEF-B552-A5E11B9E83F1}" dt="2021-04-08T02:04:33.662" v="17"/>
+          <ac:spMkLst>
+            <pc:docMk/>
+            <pc:sldMk cId="2518009482" sldId="315"/>
+            <ac:spMk id="2" creationId="{5FF5EC9A-34F6-4A23-967A-B14E9E79D82F}"/>
+          </ac:spMkLst>
+        </pc:spChg>
+        <pc:spChg chg="add mod">
+          <ac:chgData name="zhiwen zhao" userId="bc03072ab7912b87" providerId="LiveId" clId="{26DA0E79-5854-4EEF-B552-A5E11B9E83F1}" dt="2021-04-08T02:04:33.662" v="17"/>
+          <ac:spMkLst>
+            <pc:docMk/>
+            <pc:sldMk cId="2518009482" sldId="315"/>
+            <ac:spMk id="5" creationId="{A40BF874-95E3-4455-8A06-D756001574CB}"/>
+          </ac:spMkLst>
+        </pc:spChg>
+        <pc:picChg chg="add mod">
+          <ac:chgData name="zhiwen zhao" userId="bc03072ab7912b87" providerId="LiveId" clId="{26DA0E79-5854-4EEF-B552-A5E11B9E83F1}" dt="2021-04-08T02:05:06.700" v="22" actId="1076"/>
+          <ac:picMkLst>
+            <pc:docMk/>
+            <pc:sldMk cId="2518009482" sldId="315"/>
+            <ac:picMk id="7" creationId="{DDE5587B-5FAE-4E0B-8FFF-41EBDE37BAFC}"/>
+          </ac:picMkLst>
+        </pc:picChg>
+      </pc:sldChg>
+      <pc:sldChg chg="addSp delSp modSp new mod">
+        <pc:chgData name="zhiwen zhao" userId="bc03072ab7912b87" providerId="LiveId" clId="{26DA0E79-5854-4EEF-B552-A5E11B9E83F1}" dt="2021-04-08T02:04:54.100" v="20" actId="1076"/>
+        <pc:sldMkLst>
+          <pc:docMk/>
+          <pc:sldMk cId="3415091163" sldId="316"/>
+        </pc:sldMkLst>
+        <pc:spChg chg="del">
+          <ac:chgData name="zhiwen zhao" userId="bc03072ab7912b87" providerId="LiveId" clId="{26DA0E79-5854-4EEF-B552-A5E11B9E83F1}" dt="2021-04-08T02:04:36.014" v="18"/>
+          <ac:spMkLst>
+            <pc:docMk/>
+            <pc:sldMk cId="3415091163" sldId="316"/>
+            <ac:spMk id="2" creationId="{1B0B912A-CF05-4570-9083-B174F1EFCF41}"/>
+          </ac:spMkLst>
+        </pc:spChg>
+        <pc:spChg chg="add mod">
+          <ac:chgData name="zhiwen zhao" userId="bc03072ab7912b87" providerId="LiveId" clId="{26DA0E79-5854-4EEF-B552-A5E11B9E83F1}" dt="2021-04-08T02:04:36.014" v="18"/>
+          <ac:spMkLst>
+            <pc:docMk/>
+            <pc:sldMk cId="3415091163" sldId="316"/>
+            <ac:spMk id="5" creationId="{C7B76CBD-4E9E-49D5-BD17-70D19996A993}"/>
+          </ac:spMkLst>
+        </pc:spChg>
+        <pc:picChg chg="add mod">
+          <ac:chgData name="zhiwen zhao" userId="bc03072ab7912b87" providerId="LiveId" clId="{26DA0E79-5854-4EEF-B552-A5E11B9E83F1}" dt="2021-04-08T02:04:54.100" v="20" actId="1076"/>
+          <ac:picMkLst>
+            <pc:docMk/>
+            <pc:sldMk cId="3415091163" sldId="316"/>
+            <ac:picMk id="7" creationId="{07A53B9A-44DE-47BB-88A0-102B821E7FFC}"/>
+          </ac:picMkLst>
+        </pc:picChg>
+      </pc:sldChg>
+    </pc:docChg>
+  </pc:docChgLst>
+  <pc:docChgLst>
     <pc:chgData name="zhiwen zhao" userId="bc03072ab7912b87" providerId="LiveId" clId="{632E4759-346D-49DF-B20D-FB9FD497FCD4}"/>
     <pc:docChg chg="undo custSel addSld delSld modSld">
       <pc:chgData name="zhiwen zhao" userId="bc03072ab7912b87" providerId="LiveId" clId="{632E4759-346D-49DF-B20D-FB9FD497FCD4}" dt="2020-05-05T14:32:36.306" v="661" actId="20577"/>
@@ -1580,7 +1738,7 @@
           <a:p>
             <a:fld id="{661220E0-8112-4FD5-9ECD-C4518F8A921E}" type="datetimeFigureOut">
               <a:rPr lang="en-US" smtClean="0"/>
-              <a:t>3/11/2021</a:t>
+              <a:t>4/7/2021</a:t>
             </a:fld>
             <a:endParaRPr lang="en-US"/>
           </a:p>
@@ -1758,7 +1916,7 @@
           <a:p>
             <a:fld id="{EC570A9A-DD37-43E6-975F-2B5C6FA088C5}" type="datetimeFigureOut">
               <a:rPr lang="en-US" smtClean="0"/>
-              <a:t>3/11/2021</a:t>
+              <a:t>4/7/2021</a:t>
             </a:fld>
             <a:endParaRPr lang="en-US"/>
           </a:p>
@@ -2205,7 +2363,7 @@
           <a:p>
             <a:fld id="{58FFC3A0-F389-4C88-BEE9-F77C3C7B2A06}" type="datetime1">
               <a:rPr lang="en-US" smtClean="0"/>
-              <a:t>3/11/2021</a:t>
+              <a:t>4/7/2021</a:t>
             </a:fld>
             <a:endParaRPr lang="en-US"/>
           </a:p>
@@ -2369,7 +2527,7 @@
           <a:p>
             <a:fld id="{A467D2D2-D806-448D-8258-95738161CCFB}" type="datetime1">
               <a:rPr lang="en-US" smtClean="0"/>
-              <a:t>3/11/2021</a:t>
+              <a:t>4/7/2021</a:t>
             </a:fld>
             <a:endParaRPr lang="en-US"/>
           </a:p>
@@ -2543,7 +2701,7 @@
           <a:p>
             <a:fld id="{7064F3E1-451D-4203-84DD-F2D1E7480F1D}" type="datetime1">
               <a:rPr lang="en-US" smtClean="0"/>
-              <a:t>3/11/2021</a:t>
+              <a:t>4/7/2021</a:t>
             </a:fld>
             <a:endParaRPr lang="en-US"/>
           </a:p>
@@ -2707,7 +2865,7 @@
           <a:p>
             <a:fld id="{E227E46D-6D4E-4D38-8538-26D134275517}" type="datetime1">
               <a:rPr lang="en-US" smtClean="0"/>
-              <a:t>3/11/2021</a:t>
+              <a:t>4/7/2021</a:t>
             </a:fld>
             <a:endParaRPr lang="en-US"/>
           </a:p>
@@ -2948,7 +3106,7 @@
           <a:p>
             <a:fld id="{76011DF6-DA11-47A4-9B41-192C66B9D22D}" type="datetime1">
               <a:rPr lang="en-US" smtClean="0"/>
-              <a:t>3/11/2021</a:t>
+              <a:t>4/7/2021</a:t>
             </a:fld>
             <a:endParaRPr lang="en-US"/>
           </a:p>
@@ -3229,7 +3387,7 @@
           <a:p>
             <a:fld id="{CF94AFC5-DBD7-4BA2-A72C-32E835CDD8B8}" type="datetime1">
               <a:rPr lang="en-US" smtClean="0"/>
-              <a:t>3/11/2021</a:t>
+              <a:t>4/7/2021</a:t>
             </a:fld>
             <a:endParaRPr lang="en-US"/>
           </a:p>
@@ -3644,7 +3802,7 @@
           <a:p>
             <a:fld id="{8E6E8CBB-5300-4659-9449-5F0E64F32D0E}" type="datetime1">
               <a:rPr lang="en-US" smtClean="0"/>
-              <a:t>3/11/2021</a:t>
+              <a:t>4/7/2021</a:t>
             </a:fld>
             <a:endParaRPr lang="en-US"/>
           </a:p>
@@ -3757,7 +3915,7 @@
           <a:p>
             <a:fld id="{CE02FEDA-7F2C-44F6-8C81-7C15008DD81C}" type="datetime1">
               <a:rPr lang="en-US" smtClean="0"/>
-              <a:t>3/11/2021</a:t>
+              <a:t>4/7/2021</a:t>
             </a:fld>
             <a:endParaRPr lang="en-US"/>
           </a:p>
@@ -3848,7 +4006,7 @@
           <a:p>
             <a:fld id="{B2D55011-1843-4274-9534-C491F2438E42}" type="datetime1">
               <a:rPr lang="en-US" smtClean="0"/>
-              <a:t>3/11/2021</a:t>
+              <a:t>4/7/2021</a:t>
             </a:fld>
             <a:endParaRPr lang="en-US"/>
           </a:p>
@@ -4119,7 +4277,7 @@
           <a:p>
             <a:fld id="{90CE8ACF-4D86-4A43-A667-635E2BAAB854}" type="datetime1">
               <a:rPr lang="en-US" smtClean="0"/>
-              <a:t>3/11/2021</a:t>
+              <a:t>4/7/2021</a:t>
             </a:fld>
             <a:endParaRPr lang="en-US"/>
           </a:p>
@@ -4367,7 +4525,7 @@
           <a:p>
             <a:fld id="{42A1C324-A338-4216-AAD5-067A97EAA700}" type="datetime1">
               <a:rPr lang="en-US" smtClean="0"/>
-              <a:t>3/11/2021</a:t>
+              <a:t>4/7/2021</a:t>
             </a:fld>
             <a:endParaRPr lang="en-US"/>
           </a:p>
@@ -4574,7 +4732,7 @@
           <a:p>
             <a:fld id="{D0FEA00A-1F76-4B11-A98A-C6A004D23DA9}" type="datetime1">
               <a:rPr lang="en-US" smtClean="0"/>
-              <a:t>3/11/2021</a:t>
+              <a:t>4/7/2021</a:t>
             </a:fld>
             <a:endParaRPr lang="en-US"/>
           </a:p>
@@ -4996,7 +5154,7 @@
           </a:p>
           <a:p>
             <a:r>
-              <a:rPr lang="en-US"/>
+              <a:rPr lang="en-US" dirty="0"/>
               <a:t>2021/03/11</a:t>
             </a:r>
           </a:p>
@@ -5047,6 +5205,629 @@
 </file>
 
 <file path=ppt/slides/slide10.xml><?xml version="1.0" encoding="utf-8"?>
+<p:sld xmlns:a="http://schemas.openxmlformats.org/drawingml/2006/main" xmlns:r="http://schemas.openxmlformats.org/officeDocument/2006/relationships" xmlns:p="http://schemas.openxmlformats.org/presentationml/2006/main">
+  <p:cSld>
+    <p:spTree>
+      <p:nvGrpSpPr>
+        <p:cNvPr id="1" name=""/>
+        <p:cNvGrpSpPr/>
+        <p:nvPr/>
+      </p:nvGrpSpPr>
+      <p:grpSpPr>
+        <a:xfrm>
+          <a:off x="0" y="0"/>
+          <a:ext cx="0" cy="0"/>
+          <a:chOff x="0" y="0"/>
+          <a:chExt cx="0" cy="0"/>
+        </a:xfrm>
+      </p:grpSpPr>
+      <p:sp>
+        <p:nvSpPr>
+          <p:cNvPr id="3" name="Content Placeholder 2">
+            <a:extLst>
+              <a:ext uri="{FF2B5EF4-FFF2-40B4-BE49-F238E27FC236}">
+                <a16:creationId xmlns:a16="http://schemas.microsoft.com/office/drawing/2014/main" id="{C2EE7116-7617-449C-9138-E4E2A9677E09}"/>
+              </a:ext>
+            </a:extLst>
+          </p:cNvPr>
+          <p:cNvSpPr>
+            <a:spLocks noGrp="1"/>
+          </p:cNvSpPr>
+          <p:nvPr>
+            <p:ph idx="1"/>
+          </p:nvPr>
+        </p:nvSpPr>
+        <p:spPr/>
+        <p:txBody>
+          <a:bodyPr/>
+          <a:lstStyle/>
+          <a:p>
+            <a:endParaRPr lang="en-US"/>
+          </a:p>
+        </p:txBody>
+      </p:sp>
+      <p:sp>
+        <p:nvSpPr>
+          <p:cNvPr id="4" name="Slide Number Placeholder 3">
+            <a:extLst>
+              <a:ext uri="{FF2B5EF4-FFF2-40B4-BE49-F238E27FC236}">
+                <a16:creationId xmlns:a16="http://schemas.microsoft.com/office/drawing/2014/main" id="{FF12790B-8EF7-4C01-840A-0DB73CB3585E}"/>
+              </a:ext>
+            </a:extLst>
+          </p:cNvPr>
+          <p:cNvSpPr>
+            <a:spLocks noGrp="1"/>
+          </p:cNvSpPr>
+          <p:nvPr>
+            <p:ph type="sldNum" sz="quarter" idx="12"/>
+          </p:nvPr>
+        </p:nvSpPr>
+        <p:spPr/>
+        <p:txBody>
+          <a:bodyPr/>
+          <a:lstStyle/>
+          <a:p>
+            <a:fld id="{B6F15528-21DE-4FAA-801E-634DDDAF4B2B}" type="slidenum">
+              <a:rPr lang="en-US" smtClean="0"/>
+              <a:pPr/>
+              <a:t>10</a:t>
+            </a:fld>
+            <a:endParaRPr lang="en-US"/>
+          </a:p>
+        </p:txBody>
+      </p:sp>
+      <p:sp>
+        <p:nvSpPr>
+          <p:cNvPr id="5" name="Title 1">
+            <a:extLst>
+              <a:ext uri="{FF2B5EF4-FFF2-40B4-BE49-F238E27FC236}">
+                <a16:creationId xmlns:a16="http://schemas.microsoft.com/office/drawing/2014/main" id="{C7B76CBD-4E9E-49D5-BD17-70D19996A993}"/>
+              </a:ext>
+            </a:extLst>
+          </p:cNvPr>
+          <p:cNvSpPr>
+            <a:spLocks noGrp="1"/>
+          </p:cNvSpPr>
+          <p:nvPr>
+            <p:ph type="title"/>
+          </p:nvPr>
+        </p:nvSpPr>
+        <p:spPr>
+          <a:xfrm>
+            <a:off x="457200" y="274638"/>
+            <a:ext cx="8229600" cy="1143000"/>
+          </a:xfrm>
+        </p:spPr>
+        <p:txBody>
+          <a:bodyPr>
+            <a:normAutofit/>
+          </a:bodyPr>
+          <a:lstStyle/>
+          <a:p>
+            <a:pPr algn="l"/>
+            <a:r>
+              <a:rPr lang="en-US" sz="3000" dirty="0"/>
+              <a:t>PVDIS_LD2</a:t>
+            </a:r>
+          </a:p>
+        </p:txBody>
+      </p:sp>
+      <p:pic>
+        <p:nvPicPr>
+          <p:cNvPr id="7" name="Picture 6">
+            <a:extLst>
+              <a:ext uri="{FF2B5EF4-FFF2-40B4-BE49-F238E27FC236}">
+                <a16:creationId xmlns:a16="http://schemas.microsoft.com/office/drawing/2014/main" id="{07A53B9A-44DE-47BB-88A0-102B821E7FFC}"/>
+              </a:ext>
+            </a:extLst>
+          </p:cNvPr>
+          <p:cNvPicPr>
+            <a:picLocks noChangeAspect="1"/>
+          </p:cNvPicPr>
+          <p:nvPr/>
+        </p:nvPicPr>
+        <p:blipFill>
+          <a:blip r:embed="rId2"/>
+          <a:stretch>
+            <a:fillRect/>
+          </a:stretch>
+        </p:blipFill>
+        <p:spPr>
+          <a:xfrm>
+            <a:off x="0" y="1417638"/>
+            <a:ext cx="9144000" cy="5296341"/>
+          </a:xfrm>
+          <a:prstGeom prst="rect">
+            <a:avLst/>
+          </a:prstGeom>
+        </p:spPr>
+      </p:pic>
+    </p:spTree>
+    <p:extLst>
+      <p:ext uri="{BB962C8B-B14F-4D97-AF65-F5344CB8AC3E}">
+        <p14:creationId xmlns:p14="http://schemas.microsoft.com/office/powerpoint/2010/main" val="3415091163"/>
+      </p:ext>
+    </p:extLst>
+  </p:cSld>
+  <p:clrMapOvr>
+    <a:masterClrMapping/>
+  </p:clrMapOvr>
+</p:sld>
+</file>
+
+<file path=ppt/slides/slide11.xml><?xml version="1.0" encoding="utf-8"?>
+<p:sld xmlns:a="http://schemas.openxmlformats.org/drawingml/2006/main" xmlns:r="http://schemas.openxmlformats.org/officeDocument/2006/relationships" xmlns:p="http://schemas.openxmlformats.org/presentationml/2006/main">
+  <p:cSld>
+    <p:spTree>
+      <p:nvGrpSpPr>
+        <p:cNvPr id="1" name=""/>
+        <p:cNvGrpSpPr/>
+        <p:nvPr/>
+      </p:nvGrpSpPr>
+      <p:grpSpPr>
+        <a:xfrm>
+          <a:off x="0" y="0"/>
+          <a:ext cx="0" cy="0"/>
+          <a:chOff x="0" y="0"/>
+          <a:chExt cx="0" cy="0"/>
+        </a:xfrm>
+      </p:grpSpPr>
+      <p:sp>
+        <p:nvSpPr>
+          <p:cNvPr id="2" name="Title 1">
+            <a:extLst>
+              <a:ext uri="{FF2B5EF4-FFF2-40B4-BE49-F238E27FC236}">
+                <a16:creationId xmlns:a16="http://schemas.microsoft.com/office/drawing/2014/main" id="{24B0F77D-D7F9-4D8F-9CAD-E077B29CBDB1}"/>
+              </a:ext>
+            </a:extLst>
+          </p:cNvPr>
+          <p:cNvSpPr>
+            <a:spLocks noGrp="1"/>
+          </p:cNvSpPr>
+          <p:nvPr>
+            <p:ph type="title"/>
+          </p:nvPr>
+        </p:nvSpPr>
+        <p:spPr/>
+        <p:txBody>
+          <a:bodyPr/>
+          <a:lstStyle/>
+          <a:p>
+            <a:pPr algn="l"/>
+            <a:r>
+              <a:rPr lang="en-US" sz="4400" dirty="0"/>
+              <a:t>PVDIS_LD2</a:t>
+            </a:r>
+            <a:endParaRPr lang="en-US" dirty="0"/>
+          </a:p>
+        </p:txBody>
+      </p:sp>
+      <p:sp>
+        <p:nvSpPr>
+          <p:cNvPr id="3" name="Content Placeholder 2">
+            <a:extLst>
+              <a:ext uri="{FF2B5EF4-FFF2-40B4-BE49-F238E27FC236}">
+                <a16:creationId xmlns:a16="http://schemas.microsoft.com/office/drawing/2014/main" id="{E686C813-851E-4DFD-8024-60B2BB762F52}"/>
+              </a:ext>
+            </a:extLst>
+          </p:cNvPr>
+          <p:cNvSpPr>
+            <a:spLocks noGrp="1"/>
+          </p:cNvSpPr>
+          <p:nvPr>
+            <p:ph idx="1"/>
+          </p:nvPr>
+        </p:nvSpPr>
+        <p:spPr/>
+        <p:txBody>
+          <a:bodyPr/>
+          <a:lstStyle/>
+          <a:p>
+            <a:endParaRPr lang="en-US"/>
+          </a:p>
+        </p:txBody>
+      </p:sp>
+      <p:sp>
+        <p:nvSpPr>
+          <p:cNvPr id="4" name="Slide Number Placeholder 3">
+            <a:extLst>
+              <a:ext uri="{FF2B5EF4-FFF2-40B4-BE49-F238E27FC236}">
+                <a16:creationId xmlns:a16="http://schemas.microsoft.com/office/drawing/2014/main" id="{08925AE3-0507-4888-800F-A138B33AD9C5}"/>
+              </a:ext>
+            </a:extLst>
+          </p:cNvPr>
+          <p:cNvSpPr>
+            <a:spLocks noGrp="1"/>
+          </p:cNvSpPr>
+          <p:nvPr>
+            <p:ph type="sldNum" sz="quarter" idx="12"/>
+          </p:nvPr>
+        </p:nvSpPr>
+        <p:spPr/>
+        <p:txBody>
+          <a:bodyPr/>
+          <a:lstStyle/>
+          <a:p>
+            <a:fld id="{B6F15528-21DE-4FAA-801E-634DDDAF4B2B}" type="slidenum">
+              <a:rPr lang="en-US" smtClean="0"/>
+              <a:pPr/>
+              <a:t>11</a:t>
+            </a:fld>
+            <a:endParaRPr lang="en-US"/>
+          </a:p>
+        </p:txBody>
+      </p:sp>
+    </p:spTree>
+    <p:extLst>
+      <p:ext uri="{BB962C8B-B14F-4D97-AF65-F5344CB8AC3E}">
+        <p14:creationId xmlns:p14="http://schemas.microsoft.com/office/powerpoint/2010/main" val="3679008378"/>
+      </p:ext>
+    </p:extLst>
+  </p:cSld>
+  <p:clrMapOvr>
+    <a:masterClrMapping/>
+  </p:clrMapOvr>
+</p:sld>
+</file>
+
+<file path=ppt/slides/slide12.xml><?xml version="1.0" encoding="utf-8"?>
+<p:sld xmlns:a="http://schemas.openxmlformats.org/drawingml/2006/main" xmlns:r="http://schemas.openxmlformats.org/officeDocument/2006/relationships" xmlns:p="http://schemas.openxmlformats.org/presentationml/2006/main">
+  <p:cSld>
+    <p:spTree>
+      <p:nvGrpSpPr>
+        <p:cNvPr id="1" name=""/>
+        <p:cNvGrpSpPr/>
+        <p:nvPr/>
+      </p:nvGrpSpPr>
+      <p:grpSpPr>
+        <a:xfrm>
+          <a:off x="0" y="0"/>
+          <a:ext cx="0" cy="0"/>
+          <a:chOff x="0" y="0"/>
+          <a:chExt cx="0" cy="0"/>
+        </a:xfrm>
+      </p:grpSpPr>
+      <p:sp>
+        <p:nvSpPr>
+          <p:cNvPr id="2" name="Title 1">
+            <a:extLst>
+              <a:ext uri="{FF2B5EF4-FFF2-40B4-BE49-F238E27FC236}">
+                <a16:creationId xmlns:a16="http://schemas.microsoft.com/office/drawing/2014/main" id="{3AA54585-9FD4-420E-B5DA-53CDC80667EC}"/>
+              </a:ext>
+            </a:extLst>
+          </p:cNvPr>
+          <p:cNvSpPr>
+            <a:spLocks noGrp="1"/>
+          </p:cNvSpPr>
+          <p:nvPr>
+            <p:ph type="title"/>
+          </p:nvPr>
+        </p:nvSpPr>
+        <p:spPr/>
+        <p:txBody>
+          <a:bodyPr/>
+          <a:lstStyle/>
+          <a:p>
+            <a:r>
+              <a:rPr lang="en-US" dirty="0"/>
+              <a:t>backup</a:t>
+            </a:r>
+          </a:p>
+        </p:txBody>
+      </p:sp>
+      <p:sp>
+        <p:nvSpPr>
+          <p:cNvPr id="3" name="Content Placeholder 2">
+            <a:extLst>
+              <a:ext uri="{FF2B5EF4-FFF2-40B4-BE49-F238E27FC236}">
+                <a16:creationId xmlns:a16="http://schemas.microsoft.com/office/drawing/2014/main" id="{30625241-2871-4E99-8610-6A0B49A92493}"/>
+              </a:ext>
+            </a:extLst>
+          </p:cNvPr>
+          <p:cNvSpPr>
+            <a:spLocks noGrp="1"/>
+          </p:cNvSpPr>
+          <p:nvPr>
+            <p:ph idx="1"/>
+          </p:nvPr>
+        </p:nvSpPr>
+        <p:spPr/>
+        <p:txBody>
+          <a:bodyPr/>
+          <a:lstStyle/>
+          <a:p>
+            <a:endParaRPr lang="en-US"/>
+          </a:p>
+        </p:txBody>
+      </p:sp>
+      <p:sp>
+        <p:nvSpPr>
+          <p:cNvPr id="4" name="Slide Number Placeholder 3">
+            <a:extLst>
+              <a:ext uri="{FF2B5EF4-FFF2-40B4-BE49-F238E27FC236}">
+                <a16:creationId xmlns:a16="http://schemas.microsoft.com/office/drawing/2014/main" id="{CAAF5EB8-B67B-4F64-9FE7-51F1F13885CA}"/>
+              </a:ext>
+            </a:extLst>
+          </p:cNvPr>
+          <p:cNvSpPr>
+            <a:spLocks noGrp="1"/>
+          </p:cNvSpPr>
+          <p:nvPr>
+            <p:ph type="sldNum" sz="quarter" idx="12"/>
+          </p:nvPr>
+        </p:nvSpPr>
+        <p:spPr/>
+        <p:txBody>
+          <a:bodyPr/>
+          <a:lstStyle/>
+          <a:p>
+            <a:fld id="{B6F15528-21DE-4FAA-801E-634DDDAF4B2B}" type="slidenum">
+              <a:rPr lang="en-US" smtClean="0"/>
+              <a:pPr/>
+              <a:t>12</a:t>
+            </a:fld>
+            <a:endParaRPr lang="en-US"/>
+          </a:p>
+        </p:txBody>
+      </p:sp>
+    </p:spTree>
+    <p:extLst>
+      <p:ext uri="{BB962C8B-B14F-4D97-AF65-F5344CB8AC3E}">
+        <p14:creationId xmlns:p14="http://schemas.microsoft.com/office/powerpoint/2010/main" val="1388761344"/>
+      </p:ext>
+    </p:extLst>
+  </p:cSld>
+  <p:clrMapOvr>
+    <a:masterClrMapping/>
+  </p:clrMapOvr>
+</p:sld>
+</file>
+
+<file path=ppt/slides/slide13.xml><?xml version="1.0" encoding="utf-8"?>
+<p:sld xmlns:a="http://schemas.openxmlformats.org/drawingml/2006/main" xmlns:r="http://schemas.openxmlformats.org/officeDocument/2006/relationships" xmlns:p="http://schemas.openxmlformats.org/presentationml/2006/main">
+  <p:cSld>
+    <p:spTree>
+      <p:nvGrpSpPr>
+        <p:cNvPr id="1" name=""/>
+        <p:cNvGrpSpPr/>
+        <p:nvPr/>
+      </p:nvGrpSpPr>
+      <p:grpSpPr>
+        <a:xfrm>
+          <a:off x="0" y="0"/>
+          <a:ext cx="0" cy="0"/>
+          <a:chOff x="0" y="0"/>
+          <a:chExt cx="0" cy="0"/>
+        </a:xfrm>
+      </p:grpSpPr>
+      <p:sp>
+        <p:nvSpPr>
+          <p:cNvPr id="2" name="Title 1">
+            <a:extLst>
+              <a:ext uri="{FF2B5EF4-FFF2-40B4-BE49-F238E27FC236}">
+                <a16:creationId xmlns:a16="http://schemas.microsoft.com/office/drawing/2014/main" id="{C50639C4-8FB3-4E37-9A3E-1EF29E442F41}"/>
+              </a:ext>
+            </a:extLst>
+          </p:cNvPr>
+          <p:cNvSpPr>
+            <a:spLocks noGrp="1"/>
+          </p:cNvSpPr>
+          <p:nvPr>
+            <p:ph type="title"/>
+          </p:nvPr>
+        </p:nvSpPr>
+        <p:spPr/>
+        <p:txBody>
+          <a:bodyPr/>
+          <a:lstStyle/>
+          <a:p>
+            <a:endParaRPr lang="en-US" dirty="0"/>
+          </a:p>
+        </p:txBody>
+      </p:sp>
+      <p:pic>
+        <p:nvPicPr>
+          <p:cNvPr id="6" name="Content Placeholder 5" descr="Chart, histogram&#10;&#10;Description automatically generated">
+            <a:extLst>
+              <a:ext uri="{FF2B5EF4-FFF2-40B4-BE49-F238E27FC236}">
+                <a16:creationId xmlns:a16="http://schemas.microsoft.com/office/drawing/2014/main" id="{2C5ADC28-79F2-4239-A276-6A5301F2D2AA}"/>
+              </a:ext>
+            </a:extLst>
+          </p:cNvPr>
+          <p:cNvPicPr>
+            <a:picLocks noGrp="1" noChangeAspect="1"/>
+          </p:cNvPicPr>
+          <p:nvPr>
+            <p:ph idx="1"/>
+          </p:nvPr>
+        </p:nvPicPr>
+        <p:blipFill>
+          <a:blip r:embed="rId2">
+            <a:extLst>
+              <a:ext uri="{28A0092B-C50C-407E-A947-70E740481C1C}">
+                <a14:useLocalDpi xmlns:a14="http://schemas.microsoft.com/office/drawing/2010/main" val="0"/>
+              </a:ext>
+            </a:extLst>
+          </a:blip>
+          <a:stretch>
+            <a:fillRect/>
+          </a:stretch>
+        </p:blipFill>
+        <p:spPr>
+          <a:xfrm>
+            <a:off x="3124200" y="197528"/>
+            <a:ext cx="5053560" cy="2743200"/>
+          </a:xfrm>
+        </p:spPr>
+      </p:pic>
+      <p:sp>
+        <p:nvSpPr>
+          <p:cNvPr id="4" name="Slide Number Placeholder 3">
+            <a:extLst>
+              <a:ext uri="{FF2B5EF4-FFF2-40B4-BE49-F238E27FC236}">
+                <a16:creationId xmlns:a16="http://schemas.microsoft.com/office/drawing/2014/main" id="{A31ECACE-8D9F-4B90-ACFC-A8B05622EA87}"/>
+              </a:ext>
+            </a:extLst>
+          </p:cNvPr>
+          <p:cNvSpPr>
+            <a:spLocks noGrp="1"/>
+          </p:cNvSpPr>
+          <p:nvPr>
+            <p:ph type="sldNum" sz="quarter" idx="12"/>
+          </p:nvPr>
+        </p:nvSpPr>
+        <p:spPr/>
+        <p:txBody>
+          <a:bodyPr/>
+          <a:lstStyle/>
+          <a:p>
+            <a:fld id="{B6F15528-21DE-4FAA-801E-634DDDAF4B2B}" type="slidenum">
+              <a:rPr lang="en-US" smtClean="0"/>
+              <a:pPr/>
+              <a:t>13</a:t>
+            </a:fld>
+            <a:endParaRPr lang="en-US"/>
+          </a:p>
+        </p:txBody>
+      </p:sp>
+      <p:sp>
+        <p:nvSpPr>
+          <p:cNvPr id="9" name="Title 1">
+            <a:extLst>
+              <a:ext uri="{FF2B5EF4-FFF2-40B4-BE49-F238E27FC236}">
+                <a16:creationId xmlns:a16="http://schemas.microsoft.com/office/drawing/2014/main" id="{EF2B53E5-3F50-4B16-B49A-6E09F367D48F}"/>
+              </a:ext>
+            </a:extLst>
+          </p:cNvPr>
+          <p:cNvSpPr txBox="1">
+            <a:spLocks/>
+          </p:cNvSpPr>
+          <p:nvPr/>
+        </p:nvSpPr>
+        <p:spPr>
+          <a:xfrm>
+            <a:off x="609600" y="427038"/>
+            <a:ext cx="8229600" cy="1143000"/>
+          </a:xfrm>
+          <a:prstGeom prst="rect">
+            <a:avLst/>
+          </a:prstGeom>
+        </p:spPr>
+        <p:txBody>
+          <a:bodyPr vert="horz" lIns="91440" tIns="45720" rIns="91440" bIns="45720" rtlCol="0" anchor="ctr">
+            <a:normAutofit/>
+          </a:bodyPr>
+          <a:lstStyle>
+            <a:lvl1pPr algn="ctr" defTabSz="914400" rtl="0" eaLnBrk="1" latinLnBrk="0" hangingPunct="1">
+              <a:spcBef>
+                <a:spcPct val="0"/>
+              </a:spcBef>
+              <a:buNone/>
+              <a:defRPr sz="4400" kern="1200">
+                <a:solidFill>
+                  <a:schemeClr val="tx1"/>
+                </a:solidFill>
+                <a:latin typeface="+mj-lt"/>
+                <a:ea typeface="+mj-ea"/>
+                <a:cs typeface="+mj-cs"/>
+              </a:defRPr>
+            </a:lvl1pPr>
+          </a:lstStyle>
+          <a:p>
+            <a:pPr algn="l"/>
+            <a:r>
+              <a:rPr lang="en-US" sz="3000" dirty="0"/>
+              <a:t>SIDIS_He3</a:t>
+            </a:r>
+          </a:p>
+        </p:txBody>
+      </p:sp>
+      <p:pic>
+        <p:nvPicPr>
+          <p:cNvPr id="10" name="Content Placeholder 5" descr="Chart, histogram&#10;&#10;Description automatically generated">
+            <a:extLst>
+              <a:ext uri="{FF2B5EF4-FFF2-40B4-BE49-F238E27FC236}">
+                <a16:creationId xmlns:a16="http://schemas.microsoft.com/office/drawing/2014/main" id="{DA38E91C-CC1A-4555-B9BE-82E43C251784}"/>
+              </a:ext>
+            </a:extLst>
+          </p:cNvPr>
+          <p:cNvPicPr>
+            <a:picLocks noChangeAspect="1"/>
+          </p:cNvPicPr>
+          <p:nvPr/>
+        </p:nvPicPr>
+        <p:blipFill>
+          <a:blip r:embed="rId3">
+            <a:extLst>
+              <a:ext uri="{28A0092B-C50C-407E-A947-70E740481C1C}">
+                <a14:useLocalDpi xmlns:a14="http://schemas.microsoft.com/office/drawing/2010/main" val="0"/>
+              </a:ext>
+            </a:extLst>
+          </a:blip>
+          <a:stretch>
+            <a:fillRect/>
+          </a:stretch>
+        </p:blipFill>
+        <p:spPr>
+          <a:xfrm>
+            <a:off x="64021" y="4049301"/>
+            <a:ext cx="5053559" cy="2743200"/>
+          </a:xfrm>
+          <a:prstGeom prst="rect">
+            <a:avLst/>
+          </a:prstGeom>
+        </p:spPr>
+      </p:pic>
+      <p:pic>
+        <p:nvPicPr>
+          <p:cNvPr id="8" name="Picture 7" descr="Chart, histogram&#10;&#10;Description automatically generated">
+            <a:extLst>
+              <a:ext uri="{FF2B5EF4-FFF2-40B4-BE49-F238E27FC236}">
+                <a16:creationId xmlns:a16="http://schemas.microsoft.com/office/drawing/2014/main" id="{D6F052A5-6AAE-4A7B-9E5C-58A95ED6BF76}"/>
+              </a:ext>
+            </a:extLst>
+          </p:cNvPr>
+          <p:cNvPicPr>
+            <a:picLocks noChangeAspect="1"/>
+          </p:cNvPicPr>
+          <p:nvPr/>
+        </p:nvPicPr>
+        <p:blipFill>
+          <a:blip r:embed="rId4">
+            <a:extLst>
+              <a:ext uri="{28A0092B-C50C-407E-A947-70E740481C1C}">
+                <a14:useLocalDpi xmlns:a14="http://schemas.microsoft.com/office/drawing/2010/main" val="0"/>
+              </a:ext>
+            </a:extLst>
+          </a:blip>
+          <a:stretch>
+            <a:fillRect/>
+          </a:stretch>
+        </p:blipFill>
+        <p:spPr>
+          <a:xfrm>
+            <a:off x="3200400" y="2826685"/>
+            <a:ext cx="5053559" cy="2743200"/>
+          </a:xfrm>
+          <a:prstGeom prst="rect">
+            <a:avLst/>
+          </a:prstGeom>
+        </p:spPr>
+      </p:pic>
+    </p:spTree>
+    <p:extLst>
+      <p:ext uri="{BB962C8B-B14F-4D97-AF65-F5344CB8AC3E}">
+        <p14:creationId xmlns:p14="http://schemas.microsoft.com/office/powerpoint/2010/main" val="1119756300"/>
+      </p:ext>
+    </p:extLst>
+  </p:cSld>
+  <p:clrMapOvr>
+    <a:masterClrMapping/>
+  </p:clrMapOvr>
+</p:sld>
+</file>
+
+<file path=ppt/slides/slide14.xml><?xml version="1.0" encoding="utf-8"?>
 <p:sld xmlns:a="http://schemas.openxmlformats.org/drawingml/2006/main" xmlns:r="http://schemas.openxmlformats.org/officeDocument/2006/relationships" xmlns:p="http://schemas.openxmlformats.org/presentationml/2006/main">
   <p:cSld>
     <p:spTree>
@@ -5183,7 +5964,7 @@
             <a:fld id="{B6F15528-21DE-4FAA-801E-634DDDAF4B2B}" type="slidenum">
               <a:rPr lang="en-US" smtClean="0"/>
               <a:pPr/>
-              <a:t>10</a:t>
+              <a:t>14</a:t>
             </a:fld>
             <a:endParaRPr lang="en-US"/>
           </a:p>
@@ -5290,7 +6071,7 @@
 </p:sld>
 </file>
 
-<file path=ppt/slides/slide11.xml><?xml version="1.0" encoding="utf-8"?>
+<file path=ppt/slides/slide15.xml><?xml version="1.0" encoding="utf-8"?>
 <p:sld xmlns:a="http://schemas.openxmlformats.org/drawingml/2006/main" xmlns:r="http://schemas.openxmlformats.org/officeDocument/2006/relationships" xmlns:p="http://schemas.openxmlformats.org/presentationml/2006/main">
   <p:cSld>
     <p:spTree>
@@ -5469,7 +6250,7 @@
             <a:fld id="{B6F15528-21DE-4FAA-801E-634DDDAF4B2B}" type="slidenum">
               <a:rPr lang="en-US" smtClean="0"/>
               <a:pPr/>
-              <a:t>11</a:t>
+              <a:t>15</a:t>
             </a:fld>
             <a:endParaRPr lang="en-US"/>
           </a:p>
@@ -5488,7 +6269,7 @@
 </p:sld>
 </file>
 
-<file path=ppt/slides/slide12.xml><?xml version="1.0" encoding="utf-8"?>
+<file path=ppt/slides/slide16.xml><?xml version="1.0" encoding="utf-8"?>
 <p:sld xmlns:a="http://schemas.openxmlformats.org/drawingml/2006/main" xmlns:r="http://schemas.openxmlformats.org/officeDocument/2006/relationships" xmlns:p="http://schemas.openxmlformats.org/presentationml/2006/main">
   <p:cSld>
     <p:spTree>
@@ -5595,7 +6376,7 @@
             <a:fld id="{B6F15528-21DE-4FAA-801E-634DDDAF4B2B}" type="slidenum">
               <a:rPr lang="en-US" smtClean="0"/>
               <a:pPr/>
-              <a:t>12</a:t>
+              <a:t>16</a:t>
             </a:fld>
             <a:endParaRPr lang="en-US"/>
           </a:p>
@@ -6804,7 +7585,7 @@
           <p:cNvPr id="2" name="Title 1">
             <a:extLst>
               <a:ext uri="{FF2B5EF4-FFF2-40B4-BE49-F238E27FC236}">
-                <a16:creationId xmlns:a16="http://schemas.microsoft.com/office/drawing/2014/main" id="{C0BC2E03-6E07-480B-BCB6-51A311F797C3}"/>
+                <a16:creationId xmlns:a16="http://schemas.microsoft.com/office/drawing/2014/main" id="{F2DDCAB3-615D-4723-BDB4-06A97B65C3D9}"/>
               </a:ext>
             </a:extLst>
           </p:cNvPr>
@@ -6829,7 +7610,7 @@
           <p:cNvPr id="3" name="Content Placeholder 2">
             <a:extLst>
               <a:ext uri="{FF2B5EF4-FFF2-40B4-BE49-F238E27FC236}">
-                <a16:creationId xmlns:a16="http://schemas.microsoft.com/office/drawing/2014/main" id="{928C17CC-755A-4475-9A40-C89BB33B42B1}"/>
+                <a16:creationId xmlns:a16="http://schemas.microsoft.com/office/drawing/2014/main" id="{1DFD25D6-1477-4BB5-A77E-9EBA58A1BCB2}"/>
               </a:ext>
             </a:extLst>
           </p:cNvPr>
@@ -6854,7 +7635,7 @@
           <p:cNvPr id="4" name="Slide Number Placeholder 3">
             <a:extLst>
               <a:ext uri="{FF2B5EF4-FFF2-40B4-BE49-F238E27FC236}">
-                <a16:creationId xmlns:a16="http://schemas.microsoft.com/office/drawing/2014/main" id="{6016EACC-A68A-4750-B108-1A850852D357}"/>
+                <a16:creationId xmlns:a16="http://schemas.microsoft.com/office/drawing/2014/main" id="{2BB216A0-15B7-414C-8EC3-B415675F5B81}"/>
               </a:ext>
             </a:extLst>
           </p:cNvPr>
@@ -6879,10 +7660,93 @@
           </a:p>
         </p:txBody>
       </p:sp>
+      <p:pic>
+        <p:nvPicPr>
+          <p:cNvPr id="6" name="Picture 5">
+            <a:extLst>
+              <a:ext uri="{FF2B5EF4-FFF2-40B4-BE49-F238E27FC236}">
+                <a16:creationId xmlns:a16="http://schemas.microsoft.com/office/drawing/2014/main" id="{1B607094-1470-412E-8398-467A909DD160}"/>
+              </a:ext>
+            </a:extLst>
+          </p:cNvPr>
+          <p:cNvPicPr>
+            <a:picLocks noChangeAspect="1"/>
+          </p:cNvPicPr>
+          <p:nvPr/>
+        </p:nvPicPr>
+        <p:blipFill>
+          <a:blip r:embed="rId2"/>
+          <a:stretch>
+            <a:fillRect/>
+          </a:stretch>
+        </p:blipFill>
+        <p:spPr>
+          <a:xfrm>
+            <a:off x="152400" y="1557220"/>
+            <a:ext cx="9144000" cy="5296341"/>
+          </a:xfrm>
+          <a:prstGeom prst="rect">
+            <a:avLst/>
+          </a:prstGeom>
+        </p:spPr>
+      </p:pic>
+      <p:sp>
+        <p:nvSpPr>
+          <p:cNvPr id="7" name="Title 1">
+            <a:extLst>
+              <a:ext uri="{FF2B5EF4-FFF2-40B4-BE49-F238E27FC236}">
+                <a16:creationId xmlns:a16="http://schemas.microsoft.com/office/drawing/2014/main" id="{1C64E783-C974-41C2-B250-943D17BFD230}"/>
+              </a:ext>
+            </a:extLst>
+          </p:cNvPr>
+          <p:cNvSpPr txBox="1">
+            <a:spLocks/>
+          </p:cNvSpPr>
+          <p:nvPr/>
+        </p:nvSpPr>
+        <p:spPr>
+          <a:xfrm>
+            <a:off x="609600" y="427038"/>
+            <a:ext cx="8229600" cy="1143000"/>
+          </a:xfrm>
+          <a:prstGeom prst="rect">
+            <a:avLst/>
+          </a:prstGeom>
+        </p:spPr>
+        <p:txBody>
+          <a:bodyPr vert="horz" lIns="91440" tIns="45720" rIns="91440" bIns="45720" rtlCol="0" anchor="ctr">
+            <a:normAutofit/>
+          </a:bodyPr>
+          <a:lstStyle>
+            <a:lvl1pPr algn="ctr" defTabSz="914400" rtl="0" eaLnBrk="1" latinLnBrk="0" hangingPunct="1">
+              <a:spcBef>
+                <a:spcPct val="0"/>
+              </a:spcBef>
+              <a:buNone/>
+              <a:defRPr sz="4400" kern="1200">
+                <a:solidFill>
+                  <a:schemeClr val="tx1"/>
+                </a:solidFill>
+                <a:latin typeface="+mj-lt"/>
+                <a:ea typeface="+mj-ea"/>
+                <a:cs typeface="+mj-cs"/>
+              </a:defRPr>
+            </a:lvl1pPr>
+          </a:lstStyle>
+          <a:p>
+            <a:pPr algn="l"/>
+            <a:r>
+              <a:rPr lang="en-US" sz="3000"/>
+              <a:t>PVDIS_LD2</a:t>
+            </a:r>
+            <a:endParaRPr lang="en-US" sz="3000" dirty="0"/>
+          </a:p>
+        </p:txBody>
+      </p:sp>
     </p:spTree>
     <p:extLst>
       <p:ext uri="{BB962C8B-B14F-4D97-AF65-F5344CB8AC3E}">
-        <p14:creationId xmlns:p14="http://schemas.microsoft.com/office/powerpoint/2010/main" val="3947213567"/>
+        <p14:creationId xmlns:p14="http://schemas.microsoft.com/office/powerpoint/2010/main" val="1983790762"/>
       </p:ext>
     </p:extLst>
   </p:cSld>
@@ -6911,10 +7775,10 @@
       </p:grpSpPr>
       <p:sp>
         <p:nvSpPr>
-          <p:cNvPr id="2" name="Title 1">
+          <p:cNvPr id="3" name="Content Placeholder 2">
             <a:extLst>
               <a:ext uri="{FF2B5EF4-FFF2-40B4-BE49-F238E27FC236}">
-                <a16:creationId xmlns:a16="http://schemas.microsoft.com/office/drawing/2014/main" id="{3AA54585-9FD4-420E-B5DA-53CDC80667EC}"/>
+                <a16:creationId xmlns:a16="http://schemas.microsoft.com/office/drawing/2014/main" id="{D6859B93-ADC1-46C1-91E8-C9C6E37EC441}"/>
               </a:ext>
             </a:extLst>
           </p:cNvPr>
@@ -6922,34 +7786,6 @@
             <a:spLocks noGrp="1"/>
           </p:cNvSpPr>
           <p:nvPr>
-            <p:ph type="title"/>
-          </p:nvPr>
-        </p:nvSpPr>
-        <p:spPr/>
-        <p:txBody>
-          <a:bodyPr/>
-          <a:lstStyle/>
-          <a:p>
-            <a:r>
-              <a:rPr lang="en-US" dirty="0"/>
-              <a:t>backup</a:t>
-            </a:r>
-          </a:p>
-        </p:txBody>
-      </p:sp>
-      <p:sp>
-        <p:nvSpPr>
-          <p:cNvPr id="3" name="Content Placeholder 2">
-            <a:extLst>
-              <a:ext uri="{FF2B5EF4-FFF2-40B4-BE49-F238E27FC236}">
-                <a16:creationId xmlns:a16="http://schemas.microsoft.com/office/drawing/2014/main" id="{30625241-2871-4E99-8610-6A0B49A92493}"/>
-              </a:ext>
-            </a:extLst>
-          </p:cNvPr>
-          <p:cNvSpPr>
-            <a:spLocks noGrp="1"/>
-          </p:cNvSpPr>
-          <p:nvPr>
             <p:ph idx="1"/>
           </p:nvPr>
         </p:nvSpPr>
@@ -6967,7 +7803,7 @@
           <p:cNvPr id="4" name="Slide Number Placeholder 3">
             <a:extLst>
               <a:ext uri="{FF2B5EF4-FFF2-40B4-BE49-F238E27FC236}">
-                <a16:creationId xmlns:a16="http://schemas.microsoft.com/office/drawing/2014/main" id="{CAAF5EB8-B67B-4F64-9FE7-51F1F13885CA}"/>
+                <a16:creationId xmlns:a16="http://schemas.microsoft.com/office/drawing/2014/main" id="{22BCEEC6-6BE1-417E-812C-51862C115F19}"/>
               </a:ext>
             </a:extLst>
           </p:cNvPr>
@@ -6992,10 +7828,76 @@
           </a:p>
         </p:txBody>
       </p:sp>
+      <p:pic>
+        <p:nvPicPr>
+          <p:cNvPr id="6" name="Picture 5">
+            <a:extLst>
+              <a:ext uri="{FF2B5EF4-FFF2-40B4-BE49-F238E27FC236}">
+                <a16:creationId xmlns:a16="http://schemas.microsoft.com/office/drawing/2014/main" id="{7105C106-59B0-42F7-80C1-EA5E05C50946}"/>
+              </a:ext>
+            </a:extLst>
+          </p:cNvPr>
+          <p:cNvPicPr>
+            <a:picLocks noChangeAspect="1"/>
+          </p:cNvPicPr>
+          <p:nvPr/>
+        </p:nvPicPr>
+        <p:blipFill>
+          <a:blip r:embed="rId2"/>
+          <a:stretch>
+            <a:fillRect/>
+          </a:stretch>
+        </p:blipFill>
+        <p:spPr>
+          <a:xfrm>
+            <a:off x="0" y="1561659"/>
+            <a:ext cx="9144000" cy="5296341"/>
+          </a:xfrm>
+          <a:prstGeom prst="rect">
+            <a:avLst/>
+          </a:prstGeom>
+        </p:spPr>
+      </p:pic>
+      <p:sp>
+        <p:nvSpPr>
+          <p:cNvPr id="7" name="Title 1">
+            <a:extLst>
+              <a:ext uri="{FF2B5EF4-FFF2-40B4-BE49-F238E27FC236}">
+                <a16:creationId xmlns:a16="http://schemas.microsoft.com/office/drawing/2014/main" id="{83079509-72C4-4A85-BF39-20A3C3A5A2DD}"/>
+              </a:ext>
+            </a:extLst>
+          </p:cNvPr>
+          <p:cNvSpPr>
+            <a:spLocks noGrp="1"/>
+          </p:cNvSpPr>
+          <p:nvPr>
+            <p:ph type="title"/>
+          </p:nvPr>
+        </p:nvSpPr>
+        <p:spPr>
+          <a:xfrm>
+            <a:off x="457200" y="274638"/>
+            <a:ext cx="8229600" cy="1143000"/>
+          </a:xfrm>
+        </p:spPr>
+        <p:txBody>
+          <a:bodyPr>
+            <a:normAutofit/>
+          </a:bodyPr>
+          <a:lstStyle/>
+          <a:p>
+            <a:pPr algn="l"/>
+            <a:r>
+              <a:rPr lang="en-US" sz="3000" dirty="0"/>
+              <a:t>PVDIS_LD2</a:t>
+            </a:r>
+          </a:p>
+        </p:txBody>
+      </p:sp>
     </p:spTree>
     <p:extLst>
       <p:ext uri="{BB962C8B-B14F-4D97-AF65-F5344CB8AC3E}">
-        <p14:creationId xmlns:p14="http://schemas.microsoft.com/office/powerpoint/2010/main" val="1388761344"/>
+        <p14:creationId xmlns:p14="http://schemas.microsoft.com/office/powerpoint/2010/main" val="3418121055"/>
       </p:ext>
     </p:extLst>
   </p:cSld>
@@ -7024,10 +7926,10 @@
       </p:grpSpPr>
       <p:sp>
         <p:nvSpPr>
-          <p:cNvPr id="2" name="Title 1">
+          <p:cNvPr id="3" name="Content Placeholder 2">
             <a:extLst>
               <a:ext uri="{FF2B5EF4-FFF2-40B4-BE49-F238E27FC236}">
-                <a16:creationId xmlns:a16="http://schemas.microsoft.com/office/drawing/2014/main" id="{C50639C4-8FB3-4E37-9A3E-1EF29E442F41}"/>
+                <a16:creationId xmlns:a16="http://schemas.microsoft.com/office/drawing/2014/main" id="{12B0CCD3-582D-4D7B-964C-7585720DA0C7}"/>
               </a:ext>
             </a:extLst>
           </p:cNvPr>
@@ -7035,7 +7937,7 @@
             <a:spLocks noGrp="1"/>
           </p:cNvSpPr>
           <p:nvPr>
-            <p:ph type="title"/>
+            <p:ph idx="1"/>
           </p:nvPr>
         </p:nvSpPr>
         <p:spPr/>
@@ -7043,51 +7945,16 @@
           <a:bodyPr/>
           <a:lstStyle/>
           <a:p>
-            <a:endParaRPr lang="en-US" dirty="0"/>
-          </a:p>
-        </p:txBody>
-      </p:sp>
-      <p:pic>
-        <p:nvPicPr>
-          <p:cNvPr id="6" name="Content Placeholder 5" descr="Chart, histogram&#10;&#10;Description automatically generated">
-            <a:extLst>
-              <a:ext uri="{FF2B5EF4-FFF2-40B4-BE49-F238E27FC236}">
-                <a16:creationId xmlns:a16="http://schemas.microsoft.com/office/drawing/2014/main" id="{2C5ADC28-79F2-4239-A276-6A5301F2D2AA}"/>
-              </a:ext>
-            </a:extLst>
-          </p:cNvPr>
-          <p:cNvPicPr>
-            <a:picLocks noGrp="1" noChangeAspect="1"/>
-          </p:cNvPicPr>
-          <p:nvPr>
-            <p:ph idx="1"/>
-          </p:nvPr>
-        </p:nvPicPr>
-        <p:blipFill>
-          <a:blip r:embed="rId2">
-            <a:extLst>
-              <a:ext uri="{28A0092B-C50C-407E-A947-70E740481C1C}">
-                <a14:useLocalDpi xmlns:a14="http://schemas.microsoft.com/office/drawing/2010/main" val="0"/>
-              </a:ext>
-            </a:extLst>
-          </a:blip>
-          <a:stretch>
-            <a:fillRect/>
-          </a:stretch>
-        </p:blipFill>
-        <p:spPr>
-          <a:xfrm>
-            <a:off x="3124200" y="197528"/>
-            <a:ext cx="5053560" cy="2743200"/>
-          </a:xfrm>
-        </p:spPr>
-      </p:pic>
+            <a:endParaRPr lang="en-US"/>
+          </a:p>
+        </p:txBody>
+      </p:sp>
       <p:sp>
         <p:nvSpPr>
           <p:cNvPr id="4" name="Slide Number Placeholder 3">
             <a:extLst>
               <a:ext uri="{FF2B5EF4-FFF2-40B4-BE49-F238E27FC236}">
-                <a16:creationId xmlns:a16="http://schemas.microsoft.com/office/drawing/2014/main" id="{A31ECACE-8D9F-4B90-ACFC-A8B05622EA87}"/>
+                <a16:creationId xmlns:a16="http://schemas.microsoft.com/office/drawing/2014/main" id="{F46842CB-51F3-4C72-B08B-A89C67C342F0}"/>
               </a:ext>
             </a:extLst>
           </p:cNvPr>
@@ -7114,62 +7981,46 @@
       </p:sp>
       <p:sp>
         <p:nvSpPr>
-          <p:cNvPr id="9" name="Title 1">
+          <p:cNvPr id="5" name="Title 1">
             <a:extLst>
               <a:ext uri="{FF2B5EF4-FFF2-40B4-BE49-F238E27FC236}">
-                <a16:creationId xmlns:a16="http://schemas.microsoft.com/office/drawing/2014/main" id="{EF2B53E5-3F50-4B16-B49A-6E09F367D48F}"/>
+                <a16:creationId xmlns:a16="http://schemas.microsoft.com/office/drawing/2014/main" id="{A40BF874-95E3-4455-8A06-D756001574CB}"/>
               </a:ext>
             </a:extLst>
           </p:cNvPr>
-          <p:cNvSpPr txBox="1">
-            <a:spLocks/>
-          </p:cNvSpPr>
-          <p:nvPr/>
+          <p:cNvSpPr>
+            <a:spLocks noGrp="1"/>
+          </p:cNvSpPr>
+          <p:nvPr>
+            <p:ph type="title"/>
+          </p:nvPr>
         </p:nvSpPr>
         <p:spPr>
           <a:xfrm>
-            <a:off x="609600" y="427038"/>
+            <a:off x="457200" y="274638"/>
             <a:ext cx="8229600" cy="1143000"/>
           </a:xfrm>
-          <a:prstGeom prst="rect">
-            <a:avLst/>
-          </a:prstGeom>
         </p:spPr>
         <p:txBody>
-          <a:bodyPr vert="horz" lIns="91440" tIns="45720" rIns="91440" bIns="45720" rtlCol="0" anchor="ctr">
+          <a:bodyPr>
             <a:normAutofit/>
           </a:bodyPr>
-          <a:lstStyle>
-            <a:lvl1pPr algn="ctr" defTabSz="914400" rtl="0" eaLnBrk="1" latinLnBrk="0" hangingPunct="1">
-              <a:spcBef>
-                <a:spcPct val="0"/>
-              </a:spcBef>
-              <a:buNone/>
-              <a:defRPr sz="4400" kern="1200">
-                <a:solidFill>
-                  <a:schemeClr val="tx1"/>
-                </a:solidFill>
-                <a:latin typeface="+mj-lt"/>
-                <a:ea typeface="+mj-ea"/>
-                <a:cs typeface="+mj-cs"/>
-              </a:defRPr>
-            </a:lvl1pPr>
-          </a:lstStyle>
+          <a:lstStyle/>
           <a:p>
             <a:pPr algn="l"/>
             <a:r>
               <a:rPr lang="en-US" sz="3000" dirty="0"/>
-              <a:t>SIDIS_He3</a:t>
+              <a:t>PVDIS_LD2</a:t>
             </a:r>
           </a:p>
         </p:txBody>
       </p:sp>
       <p:pic>
         <p:nvPicPr>
-          <p:cNvPr id="10" name="Content Placeholder 5" descr="Chart, histogram&#10;&#10;Description automatically generated">
+          <p:cNvPr id="7" name="Picture 6">
             <a:extLst>
               <a:ext uri="{FF2B5EF4-FFF2-40B4-BE49-F238E27FC236}">
-                <a16:creationId xmlns:a16="http://schemas.microsoft.com/office/drawing/2014/main" id="{DA38E91C-CC1A-4555-B9BE-82E43C251784}"/>
+                <a16:creationId xmlns:a16="http://schemas.microsoft.com/office/drawing/2014/main" id="{DDE5587B-5FAE-4E0B-8FFF-41EBDE37BAFC}"/>
               </a:ext>
             </a:extLst>
           </p:cNvPr>
@@ -7179,57 +8030,15 @@
           <p:nvPr/>
         </p:nvPicPr>
         <p:blipFill>
-          <a:blip r:embed="rId3">
-            <a:extLst>
-              <a:ext uri="{28A0092B-C50C-407E-A947-70E740481C1C}">
-                <a14:useLocalDpi xmlns:a14="http://schemas.microsoft.com/office/drawing/2010/main" val="0"/>
-              </a:ext>
-            </a:extLst>
-          </a:blip>
+          <a:blip r:embed="rId2"/>
           <a:stretch>
             <a:fillRect/>
           </a:stretch>
         </p:blipFill>
         <p:spPr>
           <a:xfrm>
-            <a:off x="64021" y="4049301"/>
-            <a:ext cx="5053559" cy="2743200"/>
-          </a:xfrm>
-          <a:prstGeom prst="rect">
-            <a:avLst/>
-          </a:prstGeom>
-        </p:spPr>
-      </p:pic>
-      <p:pic>
-        <p:nvPicPr>
-          <p:cNvPr id="8" name="Picture 7" descr="Chart, histogram&#10;&#10;Description automatically generated">
-            <a:extLst>
-              <a:ext uri="{FF2B5EF4-FFF2-40B4-BE49-F238E27FC236}">
-                <a16:creationId xmlns:a16="http://schemas.microsoft.com/office/drawing/2014/main" id="{D6F052A5-6AAE-4A7B-9E5C-58A95ED6BF76}"/>
-              </a:ext>
-            </a:extLst>
-          </p:cNvPr>
-          <p:cNvPicPr>
-            <a:picLocks noChangeAspect="1"/>
-          </p:cNvPicPr>
-          <p:nvPr/>
-        </p:nvPicPr>
-        <p:blipFill>
-          <a:blip r:embed="rId4">
-            <a:extLst>
-              <a:ext uri="{28A0092B-C50C-407E-A947-70E740481C1C}">
-                <a14:useLocalDpi xmlns:a14="http://schemas.microsoft.com/office/drawing/2010/main" val="0"/>
-              </a:ext>
-            </a:extLst>
-          </a:blip>
-          <a:stretch>
-            <a:fillRect/>
-          </a:stretch>
-        </p:blipFill>
-        <p:spPr>
-          <a:xfrm>
-            <a:off x="3200400" y="2826685"/>
-            <a:ext cx="5053559" cy="2743200"/>
+            <a:off x="0" y="1287021"/>
+            <a:ext cx="9144000" cy="5296341"/>
           </a:xfrm>
           <a:prstGeom prst="rect">
             <a:avLst/>
@@ -7239,7 +8048,7 @@
     </p:spTree>
     <p:extLst>
       <p:ext uri="{BB962C8B-B14F-4D97-AF65-F5344CB8AC3E}">
-        <p14:creationId xmlns:p14="http://schemas.microsoft.com/office/powerpoint/2010/main" val="1119756300"/>
+        <p14:creationId xmlns:p14="http://schemas.microsoft.com/office/powerpoint/2010/main" val="2518009482"/>
       </p:ext>
     </p:extLst>
   </p:cSld>

</xml_diff>

<commit_message>
add comment for proton rejection factor
</commit_message>
<xml_diff>
--- a/analysis/pid/compare_e_pibggen_result_20200129/solid_pie_zwzhao_20210129.pptx
+++ b/analysis/pid/compare_e_pibggen_result_20200129/solid_pie_zwzhao_20210129.pptx
@@ -266,10 +266,48 @@
   <pc:docChgLst>
     <pc:chgData name="zhiwen zhao" userId="bc03072ab7912b87" providerId="LiveId" clId="{26DA0E79-5854-4EEF-B552-A5E11B9E83F1}"/>
     <pc:docChg chg="custSel addSld delSld modSld sldOrd">
-      <pc:chgData name="zhiwen zhao" userId="bc03072ab7912b87" providerId="LiveId" clId="{26DA0E79-5854-4EEF-B552-A5E11B9E83F1}" dt="2021-04-08T02:05:06.700" v="22" actId="1076"/>
+      <pc:chgData name="zhiwen zhao" userId="bc03072ab7912b87" providerId="LiveId" clId="{26DA0E79-5854-4EEF-B552-A5E11B9E83F1}" dt="2021-04-08T02:11:25.348" v="78" actId="6549"/>
       <pc:docMkLst>
         <pc:docMk/>
       </pc:docMkLst>
+      <pc:sldChg chg="modSp mod">
+        <pc:chgData name="zhiwen zhao" userId="bc03072ab7912b87" providerId="LiveId" clId="{26DA0E79-5854-4EEF-B552-A5E11B9E83F1}" dt="2021-04-08T02:10:06.980" v="34" actId="20577"/>
+        <pc:sldMkLst>
+          <pc:docMk/>
+          <pc:sldMk cId="0" sldId="256"/>
+        </pc:sldMkLst>
+        <pc:spChg chg="mod">
+          <ac:chgData name="zhiwen zhao" userId="bc03072ab7912b87" providerId="LiveId" clId="{26DA0E79-5854-4EEF-B552-A5E11B9E83F1}" dt="2021-04-08T02:10:06.980" v="34" actId="20577"/>
+          <ac:spMkLst>
+            <pc:docMk/>
+            <pc:sldMk cId="0" sldId="256"/>
+            <ac:spMk id="3" creationId="{00000000-0000-0000-0000-000000000000}"/>
+          </ac:spMkLst>
+        </pc:spChg>
+      </pc:sldChg>
+      <pc:sldChg chg="modSp mod">
+        <pc:chgData name="zhiwen zhao" userId="bc03072ab7912b87" providerId="LiveId" clId="{26DA0E79-5854-4EEF-B552-A5E11B9E83F1}" dt="2021-04-08T02:11:25.348" v="78" actId="6549"/>
+        <pc:sldMkLst>
+          <pc:docMk/>
+          <pc:sldMk cId="2510835119" sldId="299"/>
+        </pc:sldMkLst>
+        <pc:spChg chg="mod">
+          <ac:chgData name="zhiwen zhao" userId="bc03072ab7912b87" providerId="LiveId" clId="{26DA0E79-5854-4EEF-B552-A5E11B9E83F1}" dt="2021-04-08T02:11:25.348" v="78" actId="6549"/>
+          <ac:spMkLst>
+            <pc:docMk/>
+            <pc:sldMk cId="2510835119" sldId="299"/>
+            <ac:spMk id="8" creationId="{5F347E1C-767E-488B-9237-093A4AB657E1}"/>
+          </ac:spMkLst>
+        </pc:spChg>
+        <pc:spChg chg="mod">
+          <ac:chgData name="zhiwen zhao" userId="bc03072ab7912b87" providerId="LiveId" clId="{26DA0E79-5854-4EEF-B552-A5E11B9E83F1}" dt="2021-04-08T02:10:53.043" v="71" actId="1076"/>
+          <ac:spMkLst>
+            <pc:docMk/>
+            <pc:sldMk cId="2510835119" sldId="299"/>
+            <ac:spMk id="12" creationId="{E3F0D2CE-27B8-45C2-94B3-DE4769132CAD}"/>
+          </ac:spMkLst>
+        </pc:spChg>
+      </pc:sldChg>
       <pc:sldChg chg="del">
         <pc:chgData name="zhiwen zhao" userId="bc03072ab7912b87" providerId="LiveId" clId="{26DA0E79-5854-4EEF-B552-A5E11B9E83F1}" dt="2021-04-08T01:53:09.531" v="0" actId="47"/>
         <pc:sldMkLst>
@@ -5143,13 +5181,19 @@
         <p:spPr/>
         <p:txBody>
           <a:bodyPr>
-            <a:normAutofit/>
+            <a:normAutofit fontScale="85000" lnSpcReduction="20000"/>
           </a:bodyPr>
           <a:lstStyle/>
           <a:p>
             <a:r>
               <a:rPr lang="en-US" dirty="0"/>
               <a:t>Zhiwen Zhao</a:t>
+            </a:r>
+          </a:p>
+          <a:p>
+            <a:r>
+              <a:rPr lang="en-US" dirty="0"/>
+              <a:t>2021/04/07</a:t>
             </a:r>
           </a:p>
           <a:p>
@@ -6530,7 +6574,7 @@
         </p:spPr>
         <p:txBody>
           <a:bodyPr vert="horz" lIns="91440" tIns="45720" rIns="91440" bIns="45720" rtlCol="0">
-            <a:normAutofit fontScale="70000" lnSpcReduction="20000"/>
+            <a:normAutofit fontScale="62500" lnSpcReduction="20000"/>
           </a:bodyPr>
           <a:lstStyle>
             <a:lvl1pPr marL="342900" indent="-342900" algn="l" defTabSz="914400" rtl="0" eaLnBrk="1" latinLnBrk="0" hangingPunct="1">
@@ -6797,6 +6841,28 @@
             </a:r>
           </a:p>
           <a:p>
+            <a:pPr lvl="2"/>
+            <a:r>
+              <a:rPr lang="en-US" dirty="0"/>
+              <a:t>Proton rejection factor</a:t>
+            </a:r>
+          </a:p>
+          <a:p>
+            <a:pPr lvl="3"/>
+            <a:r>
+              <a:rPr lang="en-US" dirty="0"/>
+              <a:t>1e-4 </a:t>
+            </a:r>
+            <a:r>
+              <a:rPr lang="en-US"/>
+              <a:t>(FA), </a:t>
+            </a:r>
+            <a:r>
+              <a:rPr lang="en-US" dirty="0"/>
+              <a:t>for PVDIS_LD2</a:t>
+            </a:r>
+          </a:p>
+          <a:p>
             <a:r>
               <a:rPr lang="en-US" dirty="0"/>
               <a:t>pi/e ratio after pi rejection can be controlled below 1%</a:t>
@@ -6961,8 +7027,8 @@
         </p:nvSpPr>
         <p:spPr>
           <a:xfrm>
-            <a:off x="5244483" y="4343400"/>
-            <a:ext cx="3581400" cy="492443"/>
+            <a:off x="3487445" y="3990277"/>
+            <a:ext cx="5334000" cy="292388"/>
           </a:xfrm>
           <a:prstGeom prst="rect">
             <a:avLst/>

</xml_diff>